<commit_message>
update docx and pwt
</commit_message>
<xml_diff>
--- a/final/KronosKidnapping/heather_lemon_final_kidnapping_case.pptx
+++ b/final/KronosKidnapping/heather_lemon_final_kidnapping_case.pptx
@@ -5,26 +5,27 @@
     <p:sldMasterId id="2147483648" r:id="rId1"/>
   </p:sldMasterIdLst>
   <p:notesMasterIdLst>
-    <p:notesMasterId r:id="rId19"/>
+    <p:notesMasterId r:id="rId20"/>
   </p:notesMasterIdLst>
   <p:sldIdLst>
     <p:sldId id="256" r:id="rId2"/>
     <p:sldId id="258" r:id="rId3"/>
-    <p:sldId id="259" r:id="rId4"/>
-    <p:sldId id="260" r:id="rId5"/>
+    <p:sldId id="274" r:id="rId4"/>
+    <p:sldId id="259" r:id="rId5"/>
     <p:sldId id="261" r:id="rId6"/>
-    <p:sldId id="262" r:id="rId7"/>
-    <p:sldId id="263" r:id="rId8"/>
-    <p:sldId id="264" r:id="rId9"/>
-    <p:sldId id="265" r:id="rId10"/>
-    <p:sldId id="266" r:id="rId11"/>
-    <p:sldId id="267" r:id="rId12"/>
+    <p:sldId id="260" r:id="rId7"/>
+    <p:sldId id="262" r:id="rId8"/>
+    <p:sldId id="263" r:id="rId9"/>
+    <p:sldId id="264" r:id="rId10"/>
+    <p:sldId id="265" r:id="rId11"/>
+    <p:sldId id="266" r:id="rId12"/>
     <p:sldId id="268" r:id="rId13"/>
-    <p:sldId id="269" r:id="rId14"/>
-    <p:sldId id="270" r:id="rId15"/>
-    <p:sldId id="271" r:id="rId16"/>
-    <p:sldId id="272" r:id="rId17"/>
-    <p:sldId id="273" r:id="rId18"/>
+    <p:sldId id="267" r:id="rId14"/>
+    <p:sldId id="269" r:id="rId15"/>
+    <p:sldId id="270" r:id="rId16"/>
+    <p:sldId id="271" r:id="rId17"/>
+    <p:sldId id="272" r:id="rId18"/>
+    <p:sldId id="273" r:id="rId19"/>
   </p:sldIdLst>
   <p:sldSz cx="12192000" cy="6858000"/>
   <p:notesSz cx="6858000" cy="9144000"/>
@@ -213,7 +214,7 @@
           <a:p>
             <a:fld id="{0899C1D7-0031-1541-AA63-7FAEC1216BBD}" type="datetimeFigureOut">
               <a:rPr lang="en-US" smtClean="0"/>
-              <a:t>5/8/2023</a:t>
+              <a:t>5/14/2023</a:t>
             </a:fld>
             <a:endParaRPr lang="en-US"/>
           </a:p>
@@ -480,6 +481,582 @@
 </p:notesMaster>
 </file>
 
+<file path=ppt/notesSlides/notesSlide1.xml><?xml version="1.0" encoding="utf-8"?>
+<p:notes xmlns:a="http://schemas.openxmlformats.org/drawingml/2006/main" xmlns:r="http://schemas.openxmlformats.org/officeDocument/2006/relationships" xmlns:p="http://schemas.openxmlformats.org/presentationml/2006/main">
+  <p:cSld>
+    <p:spTree>
+      <p:nvGrpSpPr>
+        <p:cNvPr id="1" name=""/>
+        <p:cNvGrpSpPr/>
+        <p:nvPr/>
+      </p:nvGrpSpPr>
+      <p:grpSpPr>
+        <a:xfrm>
+          <a:off x="0" y="0"/>
+          <a:ext cx="0" cy="0"/>
+          <a:chOff x="0" y="0"/>
+          <a:chExt cx="0" cy="0"/>
+        </a:xfrm>
+      </p:grpSpPr>
+      <p:sp>
+        <p:nvSpPr>
+          <p:cNvPr id="2" name="Slide Image Placeholder 1"/>
+          <p:cNvSpPr>
+            <a:spLocks noGrp="1" noRot="1" noChangeAspect="1"/>
+          </p:cNvSpPr>
+          <p:nvPr>
+            <p:ph type="sldImg"/>
+          </p:nvPr>
+        </p:nvSpPr>
+        <p:spPr/>
+      </p:sp>
+      <p:sp>
+        <p:nvSpPr>
+          <p:cNvPr id="3" name="Notes Placeholder 2"/>
+          <p:cNvSpPr>
+            <a:spLocks noGrp="1"/>
+          </p:cNvSpPr>
+          <p:nvPr>
+            <p:ph type="body" idx="1"/>
+          </p:nvPr>
+        </p:nvSpPr>
+        <p:spPr/>
+        <p:txBody>
+          <a:bodyPr/>
+          <a:lstStyle/>
+          <a:p>
+            <a:r>
+              <a:rPr lang="en-US" dirty="0"/>
+              <a:t>So, we are going to play a game of Clue to figure out what exactly is happening in Kronos surrounding the POK members, GASTech and the government/citizens. </a:t>
+            </a:r>
+          </a:p>
+        </p:txBody>
+      </p:sp>
+      <p:sp>
+        <p:nvSpPr>
+          <p:cNvPr id="4" name="Slide Number Placeholder 3"/>
+          <p:cNvSpPr>
+            <a:spLocks noGrp="1"/>
+          </p:cNvSpPr>
+          <p:nvPr>
+            <p:ph type="sldNum" sz="quarter" idx="5"/>
+          </p:nvPr>
+        </p:nvSpPr>
+        <p:spPr/>
+        <p:txBody>
+          <a:bodyPr/>
+          <a:lstStyle/>
+          <a:p>
+            <a:fld id="{5CD270A4-E417-1544-8D83-51C2B4F7CE0F}" type="slidenum">
+              <a:rPr lang="en-US" smtClean="0"/>
+              <a:t>3</a:t>
+            </a:fld>
+            <a:endParaRPr lang="en-US"/>
+          </a:p>
+        </p:txBody>
+      </p:sp>
+    </p:spTree>
+    <p:extLst>
+      <p:ext uri="{BB962C8B-B14F-4D97-AF65-F5344CB8AC3E}">
+        <p14:creationId xmlns:p14="http://schemas.microsoft.com/office/powerpoint/2010/main" val="1788389137"/>
+      </p:ext>
+    </p:extLst>
+  </p:cSld>
+  <p:clrMapOvr>
+    <a:masterClrMapping/>
+  </p:clrMapOvr>
+</p:notes>
+</file>
+
+<file path=ppt/notesSlides/notesSlide2.xml><?xml version="1.0" encoding="utf-8"?>
+<p:notes xmlns:a="http://schemas.openxmlformats.org/drawingml/2006/main" xmlns:r="http://schemas.openxmlformats.org/officeDocument/2006/relationships" xmlns:p="http://schemas.openxmlformats.org/presentationml/2006/main">
+  <p:cSld>
+    <p:spTree>
+      <p:nvGrpSpPr>
+        <p:cNvPr id="1" name=""/>
+        <p:cNvGrpSpPr/>
+        <p:nvPr/>
+      </p:nvGrpSpPr>
+      <p:grpSpPr>
+        <a:xfrm>
+          <a:off x="0" y="0"/>
+          <a:ext cx="0" cy="0"/>
+          <a:chOff x="0" y="0"/>
+          <a:chExt cx="0" cy="0"/>
+        </a:xfrm>
+      </p:grpSpPr>
+      <p:sp>
+        <p:nvSpPr>
+          <p:cNvPr id="2" name="Slide Image Placeholder 1"/>
+          <p:cNvSpPr>
+            <a:spLocks noGrp="1" noRot="1" noChangeAspect="1"/>
+          </p:cNvSpPr>
+          <p:nvPr>
+            <p:ph type="sldImg"/>
+          </p:nvPr>
+        </p:nvSpPr>
+        <p:spPr/>
+      </p:sp>
+      <p:sp>
+        <p:nvSpPr>
+          <p:cNvPr id="3" name="Notes Placeholder 2"/>
+          <p:cNvSpPr>
+            <a:spLocks noGrp="1"/>
+          </p:cNvSpPr>
+          <p:nvPr>
+            <p:ph type="body" idx="1"/>
+          </p:nvPr>
+        </p:nvSpPr>
+        <p:spPr/>
+        <p:txBody>
+          <a:bodyPr/>
+          <a:lstStyle/>
+          <a:p>
+            <a:r>
+              <a:rPr lang="en-US" dirty="0"/>
+              <a:t>We have been given a map, an org chart of GASTech, Employee records, email headers of 2 weeks prior to the kidnapping, a few employee resumes, factsheet of </a:t>
+            </a:r>
+            <a:r>
+              <a:rPr lang="en-US" dirty="0" err="1"/>
+              <a:t>kronos</a:t>
+            </a:r>
+            <a:r>
+              <a:rPr lang="en-US" dirty="0"/>
+              <a:t> and historical reports, and news articles.</a:t>
+            </a:r>
+          </a:p>
+        </p:txBody>
+      </p:sp>
+      <p:sp>
+        <p:nvSpPr>
+          <p:cNvPr id="4" name="Slide Number Placeholder 3"/>
+          <p:cNvSpPr>
+            <a:spLocks noGrp="1"/>
+          </p:cNvSpPr>
+          <p:nvPr>
+            <p:ph type="sldNum" sz="quarter" idx="5"/>
+          </p:nvPr>
+        </p:nvSpPr>
+        <p:spPr/>
+        <p:txBody>
+          <a:bodyPr/>
+          <a:lstStyle/>
+          <a:p>
+            <a:fld id="{5CD270A4-E417-1544-8D83-51C2B4F7CE0F}" type="slidenum">
+              <a:rPr lang="en-US" smtClean="0"/>
+              <a:t>5</a:t>
+            </a:fld>
+            <a:endParaRPr lang="en-US"/>
+          </a:p>
+        </p:txBody>
+      </p:sp>
+    </p:spTree>
+    <p:extLst>
+      <p:ext uri="{BB962C8B-B14F-4D97-AF65-F5344CB8AC3E}">
+        <p14:creationId xmlns:p14="http://schemas.microsoft.com/office/powerpoint/2010/main" val="1290224874"/>
+      </p:ext>
+    </p:extLst>
+  </p:cSld>
+  <p:clrMapOvr>
+    <a:masterClrMapping/>
+  </p:clrMapOvr>
+</p:notes>
+</file>
+
+<file path=ppt/notesSlides/notesSlide3.xml><?xml version="1.0" encoding="utf-8"?>
+<p:notes xmlns:a="http://schemas.openxmlformats.org/drawingml/2006/main" xmlns:r="http://schemas.openxmlformats.org/officeDocument/2006/relationships" xmlns:p="http://schemas.openxmlformats.org/presentationml/2006/main">
+  <p:cSld>
+    <p:spTree>
+      <p:nvGrpSpPr>
+        <p:cNvPr id="1" name=""/>
+        <p:cNvGrpSpPr/>
+        <p:nvPr/>
+      </p:nvGrpSpPr>
+      <p:grpSpPr>
+        <a:xfrm>
+          <a:off x="0" y="0"/>
+          <a:ext cx="0" cy="0"/>
+          <a:chOff x="0" y="0"/>
+          <a:chExt cx="0" cy="0"/>
+        </a:xfrm>
+      </p:grpSpPr>
+      <p:sp>
+        <p:nvSpPr>
+          <p:cNvPr id="2" name="Slide Image Placeholder 1"/>
+          <p:cNvSpPr>
+            <a:spLocks noGrp="1" noRot="1" noChangeAspect="1"/>
+          </p:cNvSpPr>
+          <p:nvPr>
+            <p:ph type="sldImg"/>
+          </p:nvPr>
+        </p:nvSpPr>
+        <p:spPr/>
+      </p:sp>
+      <p:sp>
+        <p:nvSpPr>
+          <p:cNvPr id="3" name="Notes Placeholder 2"/>
+          <p:cNvSpPr>
+            <a:spLocks noGrp="1"/>
+          </p:cNvSpPr>
+          <p:nvPr>
+            <p:ph type="body" idx="1"/>
+          </p:nvPr>
+        </p:nvSpPr>
+        <p:spPr/>
+        <p:txBody>
+          <a:bodyPr/>
+          <a:lstStyle/>
+          <a:p>
+            <a:r>
+              <a:rPr lang="en-US" dirty="0"/>
+              <a:t>In 1994 the CEO discovers oil/gas fields off the Kronos coast. The POK formed in 1997 in response to the pollution of the local water supply and the resultant sickness and subsequent deaths of local residents.</a:t>
+            </a:r>
+          </a:p>
+          <a:p>
+            <a:r>
+              <a:rPr lang="en-US" dirty="0"/>
+              <a:t>1998 Juliana dies from benzene toxicity which spurs more people to join the POK.</a:t>
+            </a:r>
+          </a:p>
+          <a:p>
+            <a:r>
+              <a:rPr lang="en-US" dirty="0"/>
+              <a:t>2001, Mr. Karel leads the POK and Mr. </a:t>
+            </a:r>
+            <a:r>
+              <a:rPr lang="en-US" dirty="0" err="1"/>
+              <a:t>Nespola</a:t>
+            </a:r>
+            <a:r>
+              <a:rPr lang="en-US" dirty="0"/>
+              <a:t> dies suddenly. In addition to the environment and health concerns from the POK they added bribery and corruption to the agenda. </a:t>
+            </a:r>
+          </a:p>
+          <a:p>
+            <a:r>
+              <a:rPr lang="en-US" dirty="0"/>
+              <a:t>2005-2009 POK rallies are more militant, violent, and more civil disobedience and no laws have passed in more than 10 years. The POK have tried multiple times to get an audience with government officials and no one </a:t>
+            </a:r>
+          </a:p>
+          <a:p>
+            <a:r>
+              <a:rPr lang="en-US" dirty="0"/>
+              <a:t>wants to hear them, this includes the toxicity level reports from the river so they have data and statistics.   </a:t>
+            </a:r>
+          </a:p>
+          <a:p>
+            <a:r>
+              <a:rPr lang="en-US" dirty="0"/>
+              <a:t>2009 June – Elian Karel dies in prison cell </a:t>
+            </a:r>
+          </a:p>
+        </p:txBody>
+      </p:sp>
+      <p:sp>
+        <p:nvSpPr>
+          <p:cNvPr id="4" name="Slide Number Placeholder 3"/>
+          <p:cNvSpPr>
+            <a:spLocks noGrp="1"/>
+          </p:cNvSpPr>
+          <p:nvPr>
+            <p:ph type="sldNum" sz="quarter" idx="5"/>
+          </p:nvPr>
+        </p:nvSpPr>
+        <p:spPr/>
+        <p:txBody>
+          <a:bodyPr/>
+          <a:lstStyle/>
+          <a:p>
+            <a:fld id="{5CD270A4-E417-1544-8D83-51C2B4F7CE0F}" type="slidenum">
+              <a:rPr lang="en-US" smtClean="0"/>
+              <a:t>6</a:t>
+            </a:fld>
+            <a:endParaRPr lang="en-US"/>
+          </a:p>
+        </p:txBody>
+      </p:sp>
+    </p:spTree>
+    <p:extLst>
+      <p:ext uri="{BB962C8B-B14F-4D97-AF65-F5344CB8AC3E}">
+        <p14:creationId xmlns:p14="http://schemas.microsoft.com/office/powerpoint/2010/main" val="3919224843"/>
+      </p:ext>
+    </p:extLst>
+  </p:cSld>
+  <p:clrMapOvr>
+    <a:masterClrMapping/>
+  </p:clrMapOvr>
+</p:notes>
+</file>
+
+<file path=ppt/notesSlides/notesSlide4.xml><?xml version="1.0" encoding="utf-8"?>
+<p:notes xmlns:a="http://schemas.openxmlformats.org/drawingml/2006/main" xmlns:r="http://schemas.openxmlformats.org/officeDocument/2006/relationships" xmlns:p="http://schemas.openxmlformats.org/presentationml/2006/main">
+  <p:cSld>
+    <p:spTree>
+      <p:nvGrpSpPr>
+        <p:cNvPr id="1" name=""/>
+        <p:cNvGrpSpPr/>
+        <p:nvPr/>
+      </p:nvGrpSpPr>
+      <p:grpSpPr>
+        <a:xfrm>
+          <a:off x="0" y="0"/>
+          <a:ext cx="0" cy="0"/>
+          <a:chOff x="0" y="0"/>
+          <a:chExt cx="0" cy="0"/>
+        </a:xfrm>
+      </p:grpSpPr>
+      <p:sp>
+        <p:nvSpPr>
+          <p:cNvPr id="2" name="Slide Image Placeholder 1"/>
+          <p:cNvSpPr>
+            <a:spLocks noGrp="1" noRot="1" noChangeAspect="1"/>
+          </p:cNvSpPr>
+          <p:nvPr>
+            <p:ph type="sldImg"/>
+          </p:nvPr>
+        </p:nvSpPr>
+        <p:spPr/>
+      </p:sp>
+      <p:sp>
+        <p:nvSpPr>
+          <p:cNvPr id="3" name="Notes Placeholder 2"/>
+          <p:cNvSpPr>
+            <a:spLocks noGrp="1"/>
+          </p:cNvSpPr>
+          <p:nvPr>
+            <p:ph type="body" idx="1"/>
+          </p:nvPr>
+        </p:nvSpPr>
+        <p:spPr/>
+        <p:txBody>
+          <a:bodyPr/>
+          <a:lstStyle/>
+          <a:p>
+            <a:r>
+              <a:rPr lang="en-US" dirty="0"/>
+              <a:t>Henk </a:t>
+            </a:r>
+            <a:r>
+              <a:rPr lang="en-US" dirty="0" err="1"/>
+              <a:t>Bodrogi</a:t>
+            </a:r>
+            <a:r>
+              <a:rPr lang="en-US" dirty="0"/>
+              <a:t> is the founder and leader with 6 other co-leaders and 4 named activists. </a:t>
+            </a:r>
+          </a:p>
+        </p:txBody>
+      </p:sp>
+      <p:sp>
+        <p:nvSpPr>
+          <p:cNvPr id="4" name="Slide Number Placeholder 3"/>
+          <p:cNvSpPr>
+            <a:spLocks noGrp="1"/>
+          </p:cNvSpPr>
+          <p:nvPr>
+            <p:ph type="sldNum" sz="quarter" idx="5"/>
+          </p:nvPr>
+        </p:nvSpPr>
+        <p:spPr/>
+        <p:txBody>
+          <a:bodyPr/>
+          <a:lstStyle/>
+          <a:p>
+            <a:fld id="{5CD270A4-E417-1544-8D83-51C2B4F7CE0F}" type="slidenum">
+              <a:rPr lang="en-US" smtClean="0"/>
+              <a:t>7</a:t>
+            </a:fld>
+            <a:endParaRPr lang="en-US"/>
+          </a:p>
+        </p:txBody>
+      </p:sp>
+    </p:spTree>
+    <p:extLst>
+      <p:ext uri="{BB962C8B-B14F-4D97-AF65-F5344CB8AC3E}">
+        <p14:creationId xmlns:p14="http://schemas.microsoft.com/office/powerpoint/2010/main" val="2791294959"/>
+      </p:ext>
+    </p:extLst>
+  </p:cSld>
+  <p:clrMapOvr>
+    <a:masterClrMapping/>
+  </p:clrMapOvr>
+</p:notes>
+</file>
+
+<file path=ppt/notesSlides/notesSlide5.xml><?xml version="1.0" encoding="utf-8"?>
+<p:notes xmlns:a="http://schemas.openxmlformats.org/drawingml/2006/main" xmlns:r="http://schemas.openxmlformats.org/officeDocument/2006/relationships" xmlns:p="http://schemas.openxmlformats.org/presentationml/2006/main">
+  <p:cSld>
+    <p:spTree>
+      <p:nvGrpSpPr>
+        <p:cNvPr id="1" name=""/>
+        <p:cNvGrpSpPr/>
+        <p:nvPr/>
+      </p:nvGrpSpPr>
+      <p:grpSpPr>
+        <a:xfrm>
+          <a:off x="0" y="0"/>
+          <a:ext cx="0" cy="0"/>
+          <a:chOff x="0" y="0"/>
+          <a:chExt cx="0" cy="0"/>
+        </a:xfrm>
+      </p:grpSpPr>
+      <p:sp>
+        <p:nvSpPr>
+          <p:cNvPr id="2" name="Slide Image Placeholder 1"/>
+          <p:cNvSpPr>
+            <a:spLocks noGrp="1" noRot="1" noChangeAspect="1"/>
+          </p:cNvSpPr>
+          <p:nvPr>
+            <p:ph type="sldImg"/>
+          </p:nvPr>
+        </p:nvSpPr>
+        <p:spPr/>
+      </p:sp>
+      <p:sp>
+        <p:nvSpPr>
+          <p:cNvPr id="3" name="Notes Placeholder 2"/>
+          <p:cNvSpPr>
+            <a:spLocks noGrp="1"/>
+          </p:cNvSpPr>
+          <p:nvPr>
+            <p:ph type="body" idx="1"/>
+          </p:nvPr>
+        </p:nvSpPr>
+        <p:spPr/>
+        <p:txBody>
+          <a:bodyPr/>
+          <a:lstStyle/>
+          <a:p>
+            <a:r>
+              <a:rPr lang="en-US" dirty="0"/>
+              <a:t>Elian dies in a prison cell in 2009, Silvia takes over the POK for the past 5 years.</a:t>
+            </a:r>
+          </a:p>
+        </p:txBody>
+      </p:sp>
+      <p:sp>
+        <p:nvSpPr>
+          <p:cNvPr id="4" name="Slide Number Placeholder 3"/>
+          <p:cNvSpPr>
+            <a:spLocks noGrp="1"/>
+          </p:cNvSpPr>
+          <p:nvPr>
+            <p:ph type="sldNum" sz="quarter" idx="5"/>
+          </p:nvPr>
+        </p:nvSpPr>
+        <p:spPr/>
+        <p:txBody>
+          <a:bodyPr/>
+          <a:lstStyle/>
+          <a:p>
+            <a:fld id="{5CD270A4-E417-1544-8D83-51C2B4F7CE0F}" type="slidenum">
+              <a:rPr lang="en-US" smtClean="0"/>
+              <a:t>8</a:t>
+            </a:fld>
+            <a:endParaRPr lang="en-US"/>
+          </a:p>
+        </p:txBody>
+      </p:sp>
+    </p:spTree>
+    <p:extLst>
+      <p:ext uri="{BB962C8B-B14F-4D97-AF65-F5344CB8AC3E}">
+        <p14:creationId xmlns:p14="http://schemas.microsoft.com/office/powerpoint/2010/main" val="539109813"/>
+      </p:ext>
+    </p:extLst>
+  </p:cSld>
+  <p:clrMapOvr>
+    <a:masterClrMapping/>
+  </p:clrMapOvr>
+</p:notes>
+</file>
+
+<file path=ppt/notesSlides/notesSlide6.xml><?xml version="1.0" encoding="utf-8"?>
+<p:notes xmlns:a="http://schemas.openxmlformats.org/drawingml/2006/main" xmlns:r="http://schemas.openxmlformats.org/officeDocument/2006/relationships" xmlns:p="http://schemas.openxmlformats.org/presentationml/2006/main">
+  <p:cSld>
+    <p:spTree>
+      <p:nvGrpSpPr>
+        <p:cNvPr id="1" name=""/>
+        <p:cNvGrpSpPr/>
+        <p:nvPr/>
+      </p:nvGrpSpPr>
+      <p:grpSpPr>
+        <a:xfrm>
+          <a:off x="0" y="0"/>
+          <a:ext cx="0" cy="0"/>
+          <a:chOff x="0" y="0"/>
+          <a:chExt cx="0" cy="0"/>
+        </a:xfrm>
+      </p:grpSpPr>
+      <p:sp>
+        <p:nvSpPr>
+          <p:cNvPr id="2" name="Slide Image Placeholder 1"/>
+          <p:cNvSpPr>
+            <a:spLocks noGrp="1" noRot="1" noChangeAspect="1"/>
+          </p:cNvSpPr>
+          <p:nvPr>
+            <p:ph type="sldImg"/>
+          </p:nvPr>
+        </p:nvSpPr>
+        <p:spPr/>
+      </p:sp>
+      <p:sp>
+        <p:nvSpPr>
+          <p:cNvPr id="3" name="Notes Placeholder 2"/>
+          <p:cNvSpPr>
+            <a:spLocks noGrp="1"/>
+          </p:cNvSpPr>
+          <p:nvPr>
+            <p:ph type="body" idx="1"/>
+          </p:nvPr>
+        </p:nvSpPr>
+        <p:spPr/>
+        <p:txBody>
+          <a:bodyPr/>
+          <a:lstStyle/>
+          <a:p>
+            <a:r>
+              <a:rPr lang="en-US" dirty="0"/>
+              <a:t>Sentiment analysis of news articles </a:t>
+            </a:r>
+          </a:p>
+        </p:txBody>
+      </p:sp>
+      <p:sp>
+        <p:nvSpPr>
+          <p:cNvPr id="4" name="Slide Number Placeholder 3"/>
+          <p:cNvSpPr>
+            <a:spLocks noGrp="1"/>
+          </p:cNvSpPr>
+          <p:nvPr>
+            <p:ph type="sldNum" sz="quarter" idx="5"/>
+          </p:nvPr>
+        </p:nvSpPr>
+        <p:spPr/>
+        <p:txBody>
+          <a:bodyPr/>
+          <a:lstStyle/>
+          <a:p>
+            <a:fld id="{5CD270A4-E417-1544-8D83-51C2B4F7CE0F}" type="slidenum">
+              <a:rPr lang="en-US" smtClean="0"/>
+              <a:t>12</a:t>
+            </a:fld>
+            <a:endParaRPr lang="en-US"/>
+          </a:p>
+        </p:txBody>
+      </p:sp>
+    </p:spTree>
+    <p:extLst>
+      <p:ext uri="{BB962C8B-B14F-4D97-AF65-F5344CB8AC3E}">
+        <p14:creationId xmlns:p14="http://schemas.microsoft.com/office/powerpoint/2010/main" val="981345531"/>
+      </p:ext>
+    </p:extLst>
+  </p:cSld>
+  <p:clrMapOvr>
+    <a:masterClrMapping/>
+  </p:clrMapOvr>
+</p:notes>
+</file>
+
 <file path=ppt/slideLayouts/slideLayout1.xml><?xml version="1.0" encoding="utf-8"?>
 <p:sldLayout xmlns:a="http://schemas.openxmlformats.org/drawingml/2006/main" xmlns:r="http://schemas.openxmlformats.org/officeDocument/2006/relationships" xmlns:p="http://schemas.openxmlformats.org/presentationml/2006/main" preserve="1" userDrawn="1">
   <p:cSld name="Two Content">
@@ -7083,7 +7660,7 @@
           <a:p>
             <a:fld id="{D386965C-165C-764D-B490-A5796C92088F}" type="datetimeFigureOut">
               <a:rPr lang="en-US" smtClean="0"/>
-              <a:t>5/8/2023</a:t>
+              <a:t>5/14/2023</a:t>
             </a:fld>
             <a:endParaRPr lang="en-US"/>
           </a:p>
@@ -7529,14 +8106,23 @@
           <a:lstStyle/>
           <a:p>
             <a:r>
-              <a:rPr lang="en-US" dirty="0"/>
+              <a:rPr lang="en-US" dirty="0">
+                <a:latin typeface="Verdana" panose="020B0604030504040204" pitchFamily="34" charset="0"/>
+                <a:ea typeface="Verdana" panose="020B0604030504040204" pitchFamily="34" charset="0"/>
+              </a:rPr>
               <a:t>Heather Lemon</a:t>
             </a:r>
             <a:br>
-              <a:rPr lang="en-US" dirty="0"/>
+              <a:rPr lang="en-US" dirty="0">
+                <a:latin typeface="Verdana" panose="020B0604030504040204" pitchFamily="34" charset="0"/>
+                <a:ea typeface="Verdana" panose="020B0604030504040204" pitchFamily="34" charset="0"/>
+              </a:rPr>
             </a:br>
             <a:r>
-              <a:rPr lang="en-US" dirty="0"/>
+              <a:rPr lang="en-US" dirty="0">
+                <a:latin typeface="Verdana" panose="020B0604030504040204" pitchFamily="34" charset="0"/>
+                <a:ea typeface="Verdana" panose="020B0604030504040204" pitchFamily="34" charset="0"/>
+              </a:rPr>
               <a:t>Kronos Kidnapping Case</a:t>
             </a:r>
           </a:p>
@@ -7564,14 +8150,20 @@
           <a:lstStyle/>
           <a:p>
             <a:r>
-              <a:rPr lang="en-US" dirty="0"/>
+              <a:rPr lang="en-US" dirty="0">
+                <a:latin typeface="Verdana" panose="020B0604030504040204" pitchFamily="34" charset="0"/>
+                <a:ea typeface="Verdana" panose="020B0604030504040204" pitchFamily="34" charset="0"/>
+              </a:rPr>
               <a:t>COMP 4449 Capstone</a:t>
             </a:r>
           </a:p>
           <a:p>
             <a:r>
-              <a:rPr lang="en-US" dirty="0"/>
-              <a:t>5/8/2023</a:t>
+              <a:rPr lang="en-US" dirty="0">
+                <a:latin typeface="Verdana" panose="020B0604030504040204" pitchFamily="34" charset="0"/>
+                <a:ea typeface="Verdana" panose="020B0604030504040204" pitchFamily="34" charset="0"/>
+              </a:rPr>
+              <a:t>5/12/2023</a:t>
             </a:r>
           </a:p>
         </p:txBody>
@@ -7608,10 +8200,10 @@
       </p:grpSpPr>
       <p:sp>
         <p:nvSpPr>
-          <p:cNvPr id="2" name="Title 1">
-            <a:extLst>
-              <a:ext uri="{FF2B5EF4-FFF2-40B4-BE49-F238E27FC236}">
-                <a16:creationId xmlns:a16="http://schemas.microsoft.com/office/drawing/2014/main" id="{3ECC8D95-52D6-3241-A734-32083BDDE7AF}"/>
+          <p:cNvPr id="4" name="Title 3">
+            <a:extLst>
+              <a:ext uri="{FF2B5EF4-FFF2-40B4-BE49-F238E27FC236}">
+                <a16:creationId xmlns:a16="http://schemas.microsoft.com/office/drawing/2014/main" id="{9AD34FDC-870F-1F44-9337-AB3170DCD07C}"/>
               </a:ext>
             </a:extLst>
           </p:cNvPr>
@@ -7624,42 +8216,52 @@
         </p:nvSpPr>
         <p:spPr/>
         <p:txBody>
-          <a:bodyPr/>
+          <a:bodyPr>
+            <a:normAutofit fontScale="90000"/>
+          </a:bodyPr>
           <a:lstStyle/>
           <a:p>
-            <a:endParaRPr lang="en-US"/>
+            <a:r>
+              <a:rPr lang="en-US" dirty="0"/>
+              <a:t>Timeline 2010-2012</a:t>
+            </a:r>
           </a:p>
         </p:txBody>
       </p:sp>
-      <p:sp>
-        <p:nvSpPr>
-          <p:cNvPr id="3" name="Text Placeholder 2">
-            <a:extLst>
-              <a:ext uri="{FF2B5EF4-FFF2-40B4-BE49-F238E27FC236}">
-                <a16:creationId xmlns:a16="http://schemas.microsoft.com/office/drawing/2014/main" id="{42C7C238-DDC8-1448-908F-6FD33432D210}"/>
-              </a:ext>
-            </a:extLst>
-          </p:cNvPr>
-          <p:cNvSpPr>
-            <a:spLocks noGrp="1"/>
-          </p:cNvSpPr>
-          <p:nvPr>
-            <p:ph type="body" idx="1"/>
-          </p:nvPr>
-        </p:nvSpPr>
-        <p:spPr/>
-        <p:txBody>
-          <a:bodyPr/>
-          <a:lstStyle/>
-          <a:p>
-            <a:endParaRPr lang="en-US"/>
-          </a:p>
-        </p:txBody>
-      </p:sp>
+      <p:pic>
+        <p:nvPicPr>
+          <p:cNvPr id="7" name="Picture 6" descr="A picture containing text, screenshot, font, design&#10;&#10;Description automatically generated">
+            <a:extLst>
+              <a:ext uri="{FF2B5EF4-FFF2-40B4-BE49-F238E27FC236}">
+                <a16:creationId xmlns:a16="http://schemas.microsoft.com/office/drawing/2014/main" id="{9CD11E32-B6C9-F807-FE87-96FAF9285D28}"/>
+              </a:ext>
+            </a:extLst>
+          </p:cNvPr>
+          <p:cNvPicPr>
+            <a:picLocks noChangeAspect="1"/>
+          </p:cNvPicPr>
+          <p:nvPr/>
+        </p:nvPicPr>
+        <p:blipFill>
+          <a:blip r:embed="rId2"/>
+          <a:stretch>
+            <a:fillRect/>
+          </a:stretch>
+        </p:blipFill>
+        <p:spPr>
+          <a:xfrm>
+            <a:off x="454257" y="1110726"/>
+            <a:ext cx="10600484" cy="5366432"/>
+          </a:xfrm>
+          <a:prstGeom prst="rect">
+            <a:avLst/>
+          </a:prstGeom>
+        </p:spPr>
+      </p:pic>
     </p:spTree>
     <p:extLst>
       <p:ext uri="{BB962C8B-B14F-4D97-AF65-F5344CB8AC3E}">
-        <p14:creationId xmlns:p14="http://schemas.microsoft.com/office/powerpoint/2010/main" val="3277854522"/>
+        <p14:creationId xmlns:p14="http://schemas.microsoft.com/office/powerpoint/2010/main" val="2540176846"/>
       </p:ext>
     </p:extLst>
   </p:cSld>
@@ -7691,7 +8293,7 @@
           <p:cNvPr id="2" name="Title 1">
             <a:extLst>
               <a:ext uri="{FF2B5EF4-FFF2-40B4-BE49-F238E27FC236}">
-                <a16:creationId xmlns:a16="http://schemas.microsoft.com/office/drawing/2014/main" id="{D75A4DC4-B69B-DC4C-A6FA-BC4335D7B9E5}"/>
+                <a16:creationId xmlns:a16="http://schemas.microsoft.com/office/drawing/2014/main" id="{3ECC8D95-52D6-3241-A734-32083BDDE7AF}"/>
               </a:ext>
             </a:extLst>
           </p:cNvPr>
@@ -7707,64 +8309,47 @@
           <a:bodyPr/>
           <a:lstStyle/>
           <a:p>
-            <a:endParaRPr lang="en-US"/>
+            <a:r>
+              <a:rPr lang="en-US" dirty="0"/>
+              <a:t>Timeline 2012-2014</a:t>
+            </a:r>
           </a:p>
         </p:txBody>
       </p:sp>
-      <p:sp>
-        <p:nvSpPr>
-          <p:cNvPr id="3" name="Text Placeholder 2">
-            <a:extLst>
-              <a:ext uri="{FF2B5EF4-FFF2-40B4-BE49-F238E27FC236}">
-                <a16:creationId xmlns:a16="http://schemas.microsoft.com/office/drawing/2014/main" id="{63E99C7E-22E8-E643-AEFF-FD88DD2D989D}"/>
-              </a:ext>
-            </a:extLst>
-          </p:cNvPr>
-          <p:cNvSpPr>
-            <a:spLocks noGrp="1"/>
-          </p:cNvSpPr>
-          <p:nvPr>
-            <p:ph type="body" idx="1"/>
-          </p:nvPr>
-        </p:nvSpPr>
-        <p:spPr/>
-        <p:txBody>
-          <a:bodyPr/>
-          <a:lstStyle/>
-          <a:p>
-            <a:endParaRPr lang="en-US"/>
-          </a:p>
-        </p:txBody>
-      </p:sp>
-      <p:sp>
-        <p:nvSpPr>
-          <p:cNvPr id="4" name="Text Placeholder 3">
-            <a:extLst>
-              <a:ext uri="{FF2B5EF4-FFF2-40B4-BE49-F238E27FC236}">
-                <a16:creationId xmlns:a16="http://schemas.microsoft.com/office/drawing/2014/main" id="{1698A16C-8A37-7441-BB64-9C2A53F9F88F}"/>
-              </a:ext>
-            </a:extLst>
-          </p:cNvPr>
-          <p:cNvSpPr>
-            <a:spLocks noGrp="1"/>
-          </p:cNvSpPr>
-          <p:nvPr>
-            <p:ph type="body" idx="10"/>
-          </p:nvPr>
-        </p:nvSpPr>
-        <p:spPr/>
-        <p:txBody>
-          <a:bodyPr/>
-          <a:lstStyle/>
-          <a:p>
-            <a:endParaRPr lang="en-US"/>
-          </a:p>
-        </p:txBody>
-      </p:sp>
+      <p:pic>
+        <p:nvPicPr>
+          <p:cNvPr id="5" name="Picture 4" descr="A picture containing text, screenshot, font, design&#10;&#10;Description automatically generated">
+            <a:extLst>
+              <a:ext uri="{FF2B5EF4-FFF2-40B4-BE49-F238E27FC236}">
+                <a16:creationId xmlns:a16="http://schemas.microsoft.com/office/drawing/2014/main" id="{1E4C7D93-BA78-A2AA-883B-39E4EE1C0655}"/>
+              </a:ext>
+            </a:extLst>
+          </p:cNvPr>
+          <p:cNvPicPr>
+            <a:picLocks noChangeAspect="1"/>
+          </p:cNvPicPr>
+          <p:nvPr/>
+        </p:nvPicPr>
+        <p:blipFill>
+          <a:blip r:embed="rId2"/>
+          <a:stretch>
+            <a:fillRect/>
+          </a:stretch>
+        </p:blipFill>
+        <p:spPr>
+          <a:xfrm>
+            <a:off x="882752" y="1196992"/>
+            <a:ext cx="8643086" cy="5320845"/>
+          </a:xfrm>
+          <a:prstGeom prst="rect">
+            <a:avLst/>
+          </a:prstGeom>
+        </p:spPr>
+      </p:pic>
     </p:spTree>
     <p:extLst>
       <p:ext uri="{BB962C8B-B14F-4D97-AF65-F5344CB8AC3E}">
-        <p14:creationId xmlns:p14="http://schemas.microsoft.com/office/powerpoint/2010/main" val="2054809379"/>
+        <p14:creationId xmlns:p14="http://schemas.microsoft.com/office/powerpoint/2010/main" val="3277854522"/>
       </p:ext>
     </p:extLst>
   </p:cSld>
@@ -7812,16 +8397,19 @@
           <a:bodyPr/>
           <a:lstStyle/>
           <a:p>
-            <a:endParaRPr lang="en-US"/>
+            <a:r>
+              <a:rPr lang="en-US" dirty="0"/>
+              <a:t>News Article Facts vs Opinions </a:t>
+            </a:r>
           </a:p>
         </p:txBody>
       </p:sp>
       <p:sp>
         <p:nvSpPr>
-          <p:cNvPr id="3" name="Text Placeholder 2">
-            <a:extLst>
-              <a:ext uri="{FF2B5EF4-FFF2-40B4-BE49-F238E27FC236}">
-                <a16:creationId xmlns:a16="http://schemas.microsoft.com/office/drawing/2014/main" id="{D4CFA5C2-AC63-1D4D-BDFB-532AE38ABF1D}"/>
+          <p:cNvPr id="4" name="Text Placeholder 3">
+            <a:extLst>
+              <a:ext uri="{FF2B5EF4-FFF2-40B4-BE49-F238E27FC236}">
+                <a16:creationId xmlns:a16="http://schemas.microsoft.com/office/drawing/2014/main" id="{B93B651B-D999-344A-B24B-EB2EE32D3ADA}"/>
               </a:ext>
             </a:extLst>
           </p:cNvPr>
@@ -7829,7 +8417,7 @@
             <a:spLocks noGrp="1"/>
           </p:cNvSpPr>
           <p:nvPr>
-            <p:ph type="body" idx="1"/>
+            <p:ph type="body" idx="10"/>
           </p:nvPr>
         </p:nvSpPr>
         <p:spPr/>
@@ -7837,35 +8425,45 @@
           <a:bodyPr/>
           <a:lstStyle/>
           <a:p>
-            <a:endParaRPr lang="en-US"/>
+            <a:r>
+              <a:rPr lang="en-US" dirty="0">
+                <a:latin typeface="+mj-lt"/>
+              </a:rPr>
+              <a:t>Briefly wanted to point out the news articles of facts vs opinions. The Kronos Star has the least amount of bias when reporting their news articles. The timeline for the kidnapping will follow the Kronos Star reporting timeline. </a:t>
+            </a:r>
           </a:p>
         </p:txBody>
       </p:sp>
-      <p:sp>
-        <p:nvSpPr>
-          <p:cNvPr id="4" name="Text Placeholder 3">
-            <a:extLst>
-              <a:ext uri="{FF2B5EF4-FFF2-40B4-BE49-F238E27FC236}">
-                <a16:creationId xmlns:a16="http://schemas.microsoft.com/office/drawing/2014/main" id="{B93B651B-D999-344A-B24B-EB2EE32D3ADA}"/>
-              </a:ext>
-            </a:extLst>
-          </p:cNvPr>
-          <p:cNvSpPr>
-            <a:spLocks noGrp="1"/>
-          </p:cNvSpPr>
-          <p:nvPr>
-            <p:ph type="body" idx="10"/>
-          </p:nvPr>
-        </p:nvSpPr>
-        <p:spPr/>
-        <p:txBody>
-          <a:bodyPr/>
-          <a:lstStyle/>
-          <a:p>
-            <a:endParaRPr lang="en-US"/>
-          </a:p>
-        </p:txBody>
-      </p:sp>
+      <p:pic>
+        <p:nvPicPr>
+          <p:cNvPr id="6" name="Picture 5" descr="A picture containing text, screenshot, font, diagram&#10;&#10;Description automatically generated">
+            <a:extLst>
+              <a:ext uri="{FF2B5EF4-FFF2-40B4-BE49-F238E27FC236}">
+                <a16:creationId xmlns:a16="http://schemas.microsoft.com/office/drawing/2014/main" id="{C1E8138E-A4AC-BFD5-6D76-0CAFDDA15AC5}"/>
+              </a:ext>
+            </a:extLst>
+          </p:cNvPr>
+          <p:cNvPicPr>
+            <a:picLocks noChangeAspect="1"/>
+          </p:cNvPicPr>
+          <p:nvPr/>
+        </p:nvPicPr>
+        <p:blipFill>
+          <a:blip r:embed="rId3"/>
+          <a:stretch>
+            <a:fillRect/>
+          </a:stretch>
+        </p:blipFill>
+        <p:spPr>
+          <a:xfrm>
+            <a:off x="288199" y="1738365"/>
+            <a:ext cx="4357288" cy="4595518"/>
+          </a:xfrm>
+          <a:prstGeom prst="rect">
+            <a:avLst/>
+          </a:prstGeom>
+        </p:spPr>
+      </p:pic>
     </p:spTree>
     <p:extLst>
       <p:ext uri="{BB962C8B-B14F-4D97-AF65-F5344CB8AC3E}">
@@ -7901,7 +8499,7 @@
           <p:cNvPr id="2" name="Title 1">
             <a:extLst>
               <a:ext uri="{FF2B5EF4-FFF2-40B4-BE49-F238E27FC236}">
-                <a16:creationId xmlns:a16="http://schemas.microsoft.com/office/drawing/2014/main" id="{73651502-26B8-2141-A3C9-CD6BEAF631CE}"/>
+                <a16:creationId xmlns:a16="http://schemas.microsoft.com/office/drawing/2014/main" id="{D75A4DC4-B69B-DC4C-A6FA-BC4335D7B9E5}"/>
               </a:ext>
             </a:extLst>
           </p:cNvPr>
@@ -7914,67 +8512,22 @@
         </p:nvSpPr>
         <p:spPr/>
         <p:txBody>
-          <a:bodyPr/>
+          <a:bodyPr>
+            <a:normAutofit fontScale="90000"/>
+          </a:bodyPr>
           <a:lstStyle/>
           <a:p>
-            <a:endParaRPr lang="en-US"/>
-          </a:p>
-        </p:txBody>
-      </p:sp>
-      <p:sp>
-        <p:nvSpPr>
-          <p:cNvPr id="3" name="Text Placeholder 2">
-            <a:extLst>
-              <a:ext uri="{FF2B5EF4-FFF2-40B4-BE49-F238E27FC236}">
-                <a16:creationId xmlns:a16="http://schemas.microsoft.com/office/drawing/2014/main" id="{6FD3F824-67F2-6C4A-87DA-D380333B3B67}"/>
-              </a:ext>
-            </a:extLst>
-          </p:cNvPr>
-          <p:cNvSpPr>
-            <a:spLocks noGrp="1"/>
-          </p:cNvSpPr>
-          <p:nvPr>
-            <p:ph type="body" idx="1"/>
-          </p:nvPr>
-        </p:nvSpPr>
-        <p:spPr/>
-        <p:txBody>
-          <a:bodyPr/>
-          <a:lstStyle/>
-          <a:p>
-            <a:endParaRPr lang="en-US"/>
-          </a:p>
-        </p:txBody>
-      </p:sp>
-      <p:sp>
-        <p:nvSpPr>
-          <p:cNvPr id="4" name="Text Placeholder 3">
-            <a:extLst>
-              <a:ext uri="{FF2B5EF4-FFF2-40B4-BE49-F238E27FC236}">
-                <a16:creationId xmlns:a16="http://schemas.microsoft.com/office/drawing/2014/main" id="{3BEB3040-D840-FC42-B798-7B8DCCFEDCA2}"/>
-              </a:ext>
-            </a:extLst>
-          </p:cNvPr>
-          <p:cNvSpPr>
-            <a:spLocks noGrp="1"/>
-          </p:cNvSpPr>
-          <p:nvPr>
-            <p:ph type="body" idx="10"/>
-          </p:nvPr>
-        </p:nvSpPr>
-        <p:spPr/>
-        <p:txBody>
-          <a:bodyPr/>
-          <a:lstStyle/>
-          <a:p>
-            <a:endParaRPr lang="en-US"/>
+            <a:r>
+              <a:rPr lang="en-US" dirty="0"/>
+              <a:t>Kidnapping Timeline Events January 20-21</a:t>
+            </a:r>
           </a:p>
         </p:txBody>
       </p:sp>
     </p:spTree>
     <p:extLst>
       <p:ext uri="{BB962C8B-B14F-4D97-AF65-F5344CB8AC3E}">
-        <p14:creationId xmlns:p14="http://schemas.microsoft.com/office/powerpoint/2010/main" val="24590043"/>
+        <p14:creationId xmlns:p14="http://schemas.microsoft.com/office/powerpoint/2010/main" val="2054809379"/>
       </p:ext>
     </p:extLst>
   </p:cSld>
@@ -8006,7 +8559,7 @@
           <p:cNvPr id="2" name="Title 1">
             <a:extLst>
               <a:ext uri="{FF2B5EF4-FFF2-40B4-BE49-F238E27FC236}">
-                <a16:creationId xmlns:a16="http://schemas.microsoft.com/office/drawing/2014/main" id="{3F74C0BE-0683-B140-97D0-062BB48C2E6B}"/>
+                <a16:creationId xmlns:a16="http://schemas.microsoft.com/office/drawing/2014/main" id="{73651502-26B8-2141-A3C9-CD6BEAF631CE}"/>
               </a:ext>
             </a:extLst>
           </p:cNvPr>
@@ -8031,7 +8584,7 @@
           <p:cNvPr id="3" name="Text Placeholder 2">
             <a:extLst>
               <a:ext uri="{FF2B5EF4-FFF2-40B4-BE49-F238E27FC236}">
-                <a16:creationId xmlns:a16="http://schemas.microsoft.com/office/drawing/2014/main" id="{5C1ACD2B-9887-0A4F-A947-A39F3A46A771}"/>
+                <a16:creationId xmlns:a16="http://schemas.microsoft.com/office/drawing/2014/main" id="{6FD3F824-67F2-6C4A-87DA-D380333B3B67}"/>
               </a:ext>
             </a:extLst>
           </p:cNvPr>
@@ -8051,10 +8604,35 @@
           </a:p>
         </p:txBody>
       </p:sp>
+      <p:sp>
+        <p:nvSpPr>
+          <p:cNvPr id="4" name="Text Placeholder 3">
+            <a:extLst>
+              <a:ext uri="{FF2B5EF4-FFF2-40B4-BE49-F238E27FC236}">
+                <a16:creationId xmlns:a16="http://schemas.microsoft.com/office/drawing/2014/main" id="{3BEB3040-D840-FC42-B798-7B8DCCFEDCA2}"/>
+              </a:ext>
+            </a:extLst>
+          </p:cNvPr>
+          <p:cNvSpPr>
+            <a:spLocks noGrp="1"/>
+          </p:cNvSpPr>
+          <p:nvPr>
+            <p:ph type="body" idx="10"/>
+          </p:nvPr>
+        </p:nvSpPr>
+        <p:spPr/>
+        <p:txBody>
+          <a:bodyPr/>
+          <a:lstStyle/>
+          <a:p>
+            <a:endParaRPr lang="en-US"/>
+          </a:p>
+        </p:txBody>
+      </p:sp>
     </p:spTree>
     <p:extLst>
       <p:ext uri="{BB962C8B-B14F-4D97-AF65-F5344CB8AC3E}">
-        <p14:creationId xmlns:p14="http://schemas.microsoft.com/office/powerpoint/2010/main" val="2409348699"/>
+        <p14:creationId xmlns:p14="http://schemas.microsoft.com/office/powerpoint/2010/main" val="24590043"/>
       </p:ext>
     </p:extLst>
   </p:cSld>
@@ -8086,7 +8664,7 @@
           <p:cNvPr id="2" name="Title 1">
             <a:extLst>
               <a:ext uri="{FF2B5EF4-FFF2-40B4-BE49-F238E27FC236}">
-                <a16:creationId xmlns:a16="http://schemas.microsoft.com/office/drawing/2014/main" id="{B8684E65-9272-6945-9928-8DDC1F33474D}"/>
+                <a16:creationId xmlns:a16="http://schemas.microsoft.com/office/drawing/2014/main" id="{3F74C0BE-0683-B140-97D0-062BB48C2E6B}"/>
               </a:ext>
             </a:extLst>
           </p:cNvPr>
@@ -8111,7 +8689,7 @@
           <p:cNvPr id="3" name="Text Placeholder 2">
             <a:extLst>
               <a:ext uri="{FF2B5EF4-FFF2-40B4-BE49-F238E27FC236}">
-                <a16:creationId xmlns:a16="http://schemas.microsoft.com/office/drawing/2014/main" id="{916DA5DB-DC22-ED42-B003-05BA467F9C00}"/>
+                <a16:creationId xmlns:a16="http://schemas.microsoft.com/office/drawing/2014/main" id="{5C1ACD2B-9887-0A4F-A947-A39F3A46A771}"/>
               </a:ext>
             </a:extLst>
           </p:cNvPr>
@@ -8131,35 +8709,10 @@
           </a:p>
         </p:txBody>
       </p:sp>
-      <p:sp>
-        <p:nvSpPr>
-          <p:cNvPr id="4" name="Text Placeholder 3">
-            <a:extLst>
-              <a:ext uri="{FF2B5EF4-FFF2-40B4-BE49-F238E27FC236}">
-                <a16:creationId xmlns:a16="http://schemas.microsoft.com/office/drawing/2014/main" id="{78B08BDF-434B-D04A-A5FB-01B444B70BD4}"/>
-              </a:ext>
-            </a:extLst>
-          </p:cNvPr>
-          <p:cNvSpPr>
-            <a:spLocks noGrp="1"/>
-          </p:cNvSpPr>
-          <p:nvPr>
-            <p:ph type="body" idx="10"/>
-          </p:nvPr>
-        </p:nvSpPr>
-        <p:spPr/>
-        <p:txBody>
-          <a:bodyPr/>
-          <a:lstStyle/>
-          <a:p>
-            <a:endParaRPr lang="en-US"/>
-          </a:p>
-        </p:txBody>
-      </p:sp>
     </p:spTree>
     <p:extLst>
       <p:ext uri="{BB962C8B-B14F-4D97-AF65-F5344CB8AC3E}">
-        <p14:creationId xmlns:p14="http://schemas.microsoft.com/office/powerpoint/2010/main" val="4160229133"/>
+        <p14:creationId xmlns:p14="http://schemas.microsoft.com/office/powerpoint/2010/main" val="2409348699"/>
       </p:ext>
     </p:extLst>
   </p:cSld>
@@ -8191,6 +8744,111 @@
           <p:cNvPr id="2" name="Title 1">
             <a:extLst>
               <a:ext uri="{FF2B5EF4-FFF2-40B4-BE49-F238E27FC236}">
+                <a16:creationId xmlns:a16="http://schemas.microsoft.com/office/drawing/2014/main" id="{B8684E65-9272-6945-9928-8DDC1F33474D}"/>
+              </a:ext>
+            </a:extLst>
+          </p:cNvPr>
+          <p:cNvSpPr>
+            <a:spLocks noGrp="1"/>
+          </p:cNvSpPr>
+          <p:nvPr>
+            <p:ph type="title"/>
+          </p:nvPr>
+        </p:nvSpPr>
+        <p:spPr/>
+        <p:txBody>
+          <a:bodyPr/>
+          <a:lstStyle/>
+          <a:p>
+            <a:endParaRPr lang="en-US"/>
+          </a:p>
+        </p:txBody>
+      </p:sp>
+      <p:sp>
+        <p:nvSpPr>
+          <p:cNvPr id="3" name="Text Placeholder 2">
+            <a:extLst>
+              <a:ext uri="{FF2B5EF4-FFF2-40B4-BE49-F238E27FC236}">
+                <a16:creationId xmlns:a16="http://schemas.microsoft.com/office/drawing/2014/main" id="{916DA5DB-DC22-ED42-B003-05BA467F9C00}"/>
+              </a:ext>
+            </a:extLst>
+          </p:cNvPr>
+          <p:cNvSpPr>
+            <a:spLocks noGrp="1"/>
+          </p:cNvSpPr>
+          <p:nvPr>
+            <p:ph type="body" idx="1"/>
+          </p:nvPr>
+        </p:nvSpPr>
+        <p:spPr/>
+        <p:txBody>
+          <a:bodyPr/>
+          <a:lstStyle/>
+          <a:p>
+            <a:endParaRPr lang="en-US"/>
+          </a:p>
+        </p:txBody>
+      </p:sp>
+      <p:sp>
+        <p:nvSpPr>
+          <p:cNvPr id="4" name="Text Placeholder 3">
+            <a:extLst>
+              <a:ext uri="{FF2B5EF4-FFF2-40B4-BE49-F238E27FC236}">
+                <a16:creationId xmlns:a16="http://schemas.microsoft.com/office/drawing/2014/main" id="{78B08BDF-434B-D04A-A5FB-01B444B70BD4}"/>
+              </a:ext>
+            </a:extLst>
+          </p:cNvPr>
+          <p:cNvSpPr>
+            <a:spLocks noGrp="1"/>
+          </p:cNvSpPr>
+          <p:nvPr>
+            <p:ph type="body" idx="10"/>
+          </p:nvPr>
+        </p:nvSpPr>
+        <p:spPr/>
+        <p:txBody>
+          <a:bodyPr/>
+          <a:lstStyle/>
+          <a:p>
+            <a:endParaRPr lang="en-US"/>
+          </a:p>
+        </p:txBody>
+      </p:sp>
+    </p:spTree>
+    <p:extLst>
+      <p:ext uri="{BB962C8B-B14F-4D97-AF65-F5344CB8AC3E}">
+        <p14:creationId xmlns:p14="http://schemas.microsoft.com/office/powerpoint/2010/main" val="4160229133"/>
+      </p:ext>
+    </p:extLst>
+  </p:cSld>
+  <p:clrMapOvr>
+    <a:masterClrMapping/>
+  </p:clrMapOvr>
+</p:sld>
+</file>
+
+<file path=ppt/slides/slide17.xml><?xml version="1.0" encoding="utf-8"?>
+<p:sld xmlns:a="http://schemas.openxmlformats.org/drawingml/2006/main" xmlns:r="http://schemas.openxmlformats.org/officeDocument/2006/relationships" xmlns:p="http://schemas.openxmlformats.org/presentationml/2006/main">
+  <p:cSld>
+    <p:spTree>
+      <p:nvGrpSpPr>
+        <p:cNvPr id="1" name=""/>
+        <p:cNvGrpSpPr/>
+        <p:nvPr/>
+      </p:nvGrpSpPr>
+      <p:grpSpPr>
+        <a:xfrm>
+          <a:off x="0" y="0"/>
+          <a:ext cx="0" cy="0"/>
+          <a:chOff x="0" y="0"/>
+          <a:chExt cx="0" cy="0"/>
+        </a:xfrm>
+      </p:grpSpPr>
+      <p:sp>
+        <p:nvSpPr>
+          <p:cNvPr id="2" name="Title 1">
+            <a:extLst>
+              <a:ext uri="{FF2B5EF4-FFF2-40B4-BE49-F238E27FC236}">
                 <a16:creationId xmlns:a16="http://schemas.microsoft.com/office/drawing/2014/main" id="{926C0DC9-DF5E-684F-9782-683715C8F711}"/>
               </a:ext>
             </a:extLst>
@@ -8274,7 +8932,7 @@
 </p:sld>
 </file>
 
-<file path=ppt/slides/slide17.xml><?xml version="1.0" encoding="utf-8"?>
+<file path=ppt/slides/slide18.xml><?xml version="1.0" encoding="utf-8"?>
 <p:sld xmlns:a="http://schemas.openxmlformats.org/drawingml/2006/main" xmlns:r="http://schemas.openxmlformats.org/officeDocument/2006/relationships" xmlns:p="http://schemas.openxmlformats.org/presentationml/2006/main">
   <p:cSld>
     <p:spTree>
@@ -8412,12 +9070,22 @@
             <p:ph type="title"/>
           </p:nvPr>
         </p:nvSpPr>
-        <p:spPr/>
+        <p:spPr>
+          <a:xfrm>
+            <a:off x="855170" y="1397479"/>
+            <a:ext cx="8314709" cy="1275383"/>
+          </a:xfrm>
+        </p:spPr>
         <p:txBody>
           <a:bodyPr/>
           <a:lstStyle/>
           <a:p>
-            <a:endParaRPr lang="en-US"/>
+            <a:r>
+              <a:rPr lang="en-US" dirty="0">
+                <a:latin typeface="+mj-lt"/>
+              </a:rPr>
+              <a:t>Case Background: </a:t>
+            </a:r>
           </a:p>
         </p:txBody>
       </p:sp>
@@ -8437,12 +9105,31 @@
             <p:ph type="body" idx="11"/>
           </p:nvPr>
         </p:nvSpPr>
-        <p:spPr/>
+        <p:spPr>
+          <a:xfrm>
+            <a:off x="855170" y="2753248"/>
+            <a:ext cx="8314709" cy="2707273"/>
+          </a:xfrm>
+        </p:spPr>
         <p:txBody>
-          <a:bodyPr/>
+          <a:bodyPr>
+            <a:normAutofit fontScale="77500" lnSpcReduction="20000"/>
+          </a:bodyPr>
           <a:lstStyle/>
           <a:p>
-            <a:endParaRPr lang="en-US"/>
+            <a:r>
+              <a:rPr lang="en-US" b="0" dirty="0">
+                <a:solidFill>
+                  <a:srgbClr val="CCCCCC"/>
+                </a:solidFill>
+                <a:effectLst/>
+                <a:latin typeface="+mn-lt"/>
+              </a:rPr>
+              <a:t>In January 2014, the leaders of GASTech are celebrating their new-found fortune as a result of the IPO of their very successful company. In the midst of this celebration, several employees of GASTech go missing. An organization known as the Protectors of Kronos (POK) is suspected in the disappearance, but things may not be what they seem...</a:t>
+            </a:r>
+          </a:p>
+          <a:p>
+            <a:endParaRPr lang="en-US" dirty="0"/>
           </a:p>
         </p:txBody>
       </p:sp>
@@ -8476,60 +9163,40 @@
           <a:chExt cx="0" cy="0"/>
         </a:xfrm>
       </p:grpSpPr>
-      <p:sp>
-        <p:nvSpPr>
-          <p:cNvPr id="2" name="Title 1">
-            <a:extLst>
-              <a:ext uri="{FF2B5EF4-FFF2-40B4-BE49-F238E27FC236}">
-                <a16:creationId xmlns:a16="http://schemas.microsoft.com/office/drawing/2014/main" id="{CF939169-4C3E-4A48-8916-798010E1EE3D}"/>
-              </a:ext>
-            </a:extLst>
-          </p:cNvPr>
-          <p:cNvSpPr>
-            <a:spLocks noGrp="1"/>
-          </p:cNvSpPr>
-          <p:nvPr>
-            <p:ph type="title"/>
-          </p:nvPr>
-        </p:nvSpPr>
-        <p:spPr/>
-        <p:txBody>
-          <a:bodyPr/>
-          <a:lstStyle/>
-          <a:p>
-            <a:endParaRPr lang="en-US"/>
-          </a:p>
-        </p:txBody>
-      </p:sp>
-      <p:sp>
-        <p:nvSpPr>
-          <p:cNvPr id="3" name="Content Placeholder 2">
-            <a:extLst>
-              <a:ext uri="{FF2B5EF4-FFF2-40B4-BE49-F238E27FC236}">
-                <a16:creationId xmlns:a16="http://schemas.microsoft.com/office/drawing/2014/main" id="{81D24625-9C60-7C41-B88A-6C1F51A05DE2}"/>
-              </a:ext>
-            </a:extLst>
-          </p:cNvPr>
-          <p:cNvSpPr>
-            <a:spLocks noGrp="1"/>
-          </p:cNvSpPr>
-          <p:nvPr>
-            <p:ph idx="1"/>
-          </p:nvPr>
-        </p:nvSpPr>
-        <p:spPr/>
-        <p:txBody>
-          <a:bodyPr/>
-          <a:lstStyle/>
-          <a:p>
-            <a:endParaRPr lang="en-US"/>
-          </a:p>
-        </p:txBody>
-      </p:sp>
+      <p:pic>
+        <p:nvPicPr>
+          <p:cNvPr id="5" name="Picture 4" descr="A person pointing at papers on a wall&#10;&#10;Description automatically generated with low confidence">
+            <a:extLst>
+              <a:ext uri="{FF2B5EF4-FFF2-40B4-BE49-F238E27FC236}">
+                <a16:creationId xmlns:a16="http://schemas.microsoft.com/office/drawing/2014/main" id="{4C033067-06B0-97C9-137F-520E7AB15487}"/>
+              </a:ext>
+            </a:extLst>
+          </p:cNvPr>
+          <p:cNvPicPr>
+            <a:picLocks noChangeAspect="1"/>
+          </p:cNvPicPr>
+          <p:nvPr/>
+        </p:nvPicPr>
+        <p:blipFill>
+          <a:blip r:embed="rId3"/>
+          <a:stretch>
+            <a:fillRect/>
+          </a:stretch>
+        </p:blipFill>
+        <p:spPr>
+          <a:xfrm>
+            <a:off x="1260036" y="552659"/>
+            <a:ext cx="6934094" cy="5290457"/>
+          </a:xfrm>
+          <a:prstGeom prst="rect">
+            <a:avLst/>
+          </a:prstGeom>
+        </p:spPr>
+      </p:pic>
     </p:spTree>
     <p:extLst>
       <p:ext uri="{BB962C8B-B14F-4D97-AF65-F5344CB8AC3E}">
-        <p14:creationId xmlns:p14="http://schemas.microsoft.com/office/powerpoint/2010/main" val="1134512367"/>
+        <p14:creationId xmlns:p14="http://schemas.microsoft.com/office/powerpoint/2010/main" val="4177224707"/>
       </p:ext>
     </p:extLst>
   </p:cSld>
@@ -8561,7 +9228,7 @@
           <p:cNvPr id="2" name="Title 1">
             <a:extLst>
               <a:ext uri="{FF2B5EF4-FFF2-40B4-BE49-F238E27FC236}">
-                <a16:creationId xmlns:a16="http://schemas.microsoft.com/office/drawing/2014/main" id="{BCFBCC4B-1D22-0141-B9B9-D29673A3133C}"/>
+                <a16:creationId xmlns:a16="http://schemas.microsoft.com/office/drawing/2014/main" id="{CF939169-4C3E-4A48-8916-798010E1EE3D}"/>
               </a:ext>
             </a:extLst>
           </p:cNvPr>
@@ -8577,7 +9244,12 @@
           <a:bodyPr/>
           <a:lstStyle/>
           <a:p>
-            <a:endParaRPr lang="en-US"/>
+            <a:r>
+              <a:rPr lang="en-US" dirty="0">
+                <a:latin typeface="+mj-lt"/>
+              </a:rPr>
+              <a:t>Questions to be answered</a:t>
+            </a:r>
           </a:p>
         </p:txBody>
       </p:sp>
@@ -8586,7 +9258,7 @@
           <p:cNvPr id="3" name="Content Placeholder 2">
             <a:extLst>
               <a:ext uri="{FF2B5EF4-FFF2-40B4-BE49-F238E27FC236}">
-                <a16:creationId xmlns:a16="http://schemas.microsoft.com/office/drawing/2014/main" id="{66DF01B3-85CD-2B49-99F4-45B5074A2CEF}"/>
+                <a16:creationId xmlns:a16="http://schemas.microsoft.com/office/drawing/2014/main" id="{81D24625-9C60-7C41-B88A-6C1F51A05DE2}"/>
               </a:ext>
             </a:extLst>
           </p:cNvPr>
@@ -8599,17 +9271,151 @@
         </p:nvSpPr>
         <p:spPr/>
         <p:txBody>
-          <a:bodyPr/>
+          <a:bodyPr>
+            <a:normAutofit fontScale="70000" lnSpcReduction="20000"/>
+          </a:bodyPr>
           <a:lstStyle/>
           <a:p>
-            <a:endParaRPr lang="en-US"/>
+            <a:pPr marL="514350" indent="-514350">
+              <a:buAutoNum type="arabicPeriod"/>
+            </a:pPr>
+            <a:r>
+              <a:rPr lang="en-US" b="0" dirty="0">
+                <a:solidFill>
+                  <a:srgbClr val="000000"/>
+                </a:solidFill>
+                <a:effectLst/>
+                <a:latin typeface="Verdana" panose="020B0604030504040204" pitchFamily="34" charset="0"/>
+                <a:ea typeface="Verdana" panose="020B0604030504040204" pitchFamily="34" charset="0"/>
+              </a:rPr>
+              <a:t>Provide a clear analysis of the structure of the Protectors of Kronos network, with supporting evidence.</a:t>
+            </a:r>
+          </a:p>
+          <a:p>
+            <a:pPr lvl="1">
+              <a:lnSpc>
+                <a:spcPct val="120000"/>
+              </a:lnSpc>
+              <a:spcBef>
+                <a:spcPts val="600"/>
+              </a:spcBef>
+            </a:pPr>
+            <a:r>
+              <a:rPr lang="en-US" b="0" dirty="0">
+                <a:solidFill>
+                  <a:srgbClr val="000000"/>
+                </a:solidFill>
+                <a:effectLst/>
+                <a:latin typeface="Verdana" panose="020B0604030504040204" pitchFamily="34" charset="0"/>
+                <a:ea typeface="Verdana" panose="020B0604030504040204" pitchFamily="34" charset="0"/>
+              </a:rPr>
+              <a:t>Who are the leaders?</a:t>
+            </a:r>
+          </a:p>
+          <a:p>
+            <a:pPr lvl="1">
+              <a:lnSpc>
+                <a:spcPct val="120000"/>
+              </a:lnSpc>
+              <a:spcBef>
+                <a:spcPts val="600"/>
+              </a:spcBef>
+            </a:pPr>
+            <a:r>
+              <a:rPr lang="en-US" b="0" dirty="0">
+                <a:solidFill>
+                  <a:srgbClr val="000000"/>
+                </a:solidFill>
+                <a:effectLst/>
+                <a:latin typeface="Verdana" panose="020B0604030504040204" pitchFamily="34" charset="0"/>
+                <a:ea typeface="Verdana" panose="020B0604030504040204" pitchFamily="34" charset="0"/>
+              </a:rPr>
+              <a:t>Who is part of the extended network?</a:t>
+            </a:r>
+          </a:p>
+          <a:p>
+            <a:pPr lvl="1">
+              <a:lnSpc>
+                <a:spcPct val="120000"/>
+              </a:lnSpc>
+              <a:spcBef>
+                <a:spcPts val="600"/>
+              </a:spcBef>
+            </a:pPr>
+            <a:r>
+              <a:rPr lang="en-US" b="0" dirty="0">
+                <a:solidFill>
+                  <a:srgbClr val="000000"/>
+                </a:solidFill>
+                <a:effectLst/>
+                <a:latin typeface="Verdana" panose="020B0604030504040204" pitchFamily="34" charset="0"/>
+                <a:ea typeface="Verdana" panose="020B0604030504040204" pitchFamily="34" charset="0"/>
+              </a:rPr>
+              <a:t>How has the group structure and organization changed over time?</a:t>
+            </a:r>
+          </a:p>
+          <a:p>
+            <a:pPr lvl="1">
+              <a:lnSpc>
+                <a:spcPct val="120000"/>
+              </a:lnSpc>
+              <a:spcBef>
+                <a:spcPts val="600"/>
+              </a:spcBef>
+            </a:pPr>
+            <a:r>
+              <a:rPr lang="en-US" b="0" dirty="0">
+                <a:solidFill>
+                  <a:srgbClr val="000000"/>
+                </a:solidFill>
+                <a:effectLst/>
+                <a:latin typeface="Verdana" panose="020B0604030504040204" pitchFamily="34" charset="0"/>
+                <a:ea typeface="Verdana" panose="020B0604030504040204" pitchFamily="34" charset="0"/>
+              </a:rPr>
+              <a:t>Where are the potential connections between the POK and GASTech?</a:t>
+            </a:r>
+          </a:p>
+          <a:p>
+            <a:pPr marL="0" indent="0">
+              <a:buNone/>
+            </a:pPr>
+            <a:r>
+              <a:rPr lang="en-US" b="0" dirty="0">
+                <a:solidFill>
+                  <a:srgbClr val="000000"/>
+                </a:solidFill>
+                <a:effectLst/>
+                <a:latin typeface="Verdana" panose="020B0604030504040204" pitchFamily="34" charset="0"/>
+                <a:ea typeface="Verdana" panose="020B0604030504040204" pitchFamily="34" charset="0"/>
+              </a:rPr>
+              <a:t>2. Describe the events of January 20-21, 2014. What is the timeline of events? </a:t>
+            </a:r>
+          </a:p>
+          <a:p>
+            <a:pPr marL="0" indent="0">
+              <a:buNone/>
+            </a:pPr>
+            <a:r>
+              <a:rPr lang="en-US" b="0" dirty="0">
+                <a:solidFill>
+                  <a:srgbClr val="000000"/>
+                </a:solidFill>
+                <a:effectLst/>
+                <a:latin typeface="Verdana" panose="020B0604030504040204" pitchFamily="34" charset="0"/>
+                <a:ea typeface="Verdana" panose="020B0604030504040204" pitchFamily="34" charset="0"/>
+              </a:rPr>
+              <a:t>3. Provide at least two possible explanations why the GASTech employees may be missing. What evidence do you have to support each of these explanations?</a:t>
+            </a:r>
+          </a:p>
+          <a:p>
+            <a:endParaRPr lang="en-US" dirty="0"/>
           </a:p>
         </p:txBody>
       </p:sp>
     </p:spTree>
     <p:extLst>
       <p:ext uri="{BB962C8B-B14F-4D97-AF65-F5344CB8AC3E}">
-        <p14:creationId xmlns:p14="http://schemas.microsoft.com/office/powerpoint/2010/main" val="248586208"/>
+        <p14:creationId xmlns:p14="http://schemas.microsoft.com/office/powerpoint/2010/main" val="1134512367"/>
       </p:ext>
     </p:extLst>
   </p:cSld>
@@ -8657,7 +9463,10 @@
           <a:bodyPr/>
           <a:lstStyle/>
           <a:p>
-            <a:endParaRPr lang="en-US"/>
+            <a:r>
+              <a:rPr lang="en-US" dirty="0"/>
+              <a:t>Dataset Description</a:t>
+            </a:r>
           </a:p>
         </p:txBody>
       </p:sp>
@@ -8679,10 +9488,173 @@
         </p:nvSpPr>
         <p:spPr/>
         <p:txBody>
-          <a:bodyPr/>
+          <a:bodyPr>
+            <a:normAutofit fontScale="77500" lnSpcReduction="20000"/>
+          </a:bodyPr>
           <a:lstStyle/>
           <a:p>
-            <a:endParaRPr lang="en-US"/>
+            <a:r>
+              <a:rPr lang="en-US" b="0" dirty="0">
+                <a:solidFill>
+                  <a:srgbClr val="000000"/>
+                </a:solidFill>
+                <a:effectLst/>
+                <a:latin typeface="+mj-lt"/>
+              </a:rPr>
+              <a:t>A map of Kronos</a:t>
+            </a:r>
+          </a:p>
+          <a:p>
+            <a:r>
+              <a:rPr lang="en-US" b="0" dirty="0">
+                <a:solidFill>
+                  <a:srgbClr val="000000"/>
+                </a:solidFill>
+                <a:effectLst/>
+                <a:latin typeface="+mj-lt"/>
+              </a:rPr>
+              <a:t>A chart describing the local </a:t>
+            </a:r>
+            <a:r>
+              <a:rPr lang="en-US" b="0" dirty="0" err="1">
+                <a:solidFill>
+                  <a:srgbClr val="000000"/>
+                </a:solidFill>
+                <a:effectLst/>
+                <a:latin typeface="+mj-lt"/>
+              </a:rPr>
+              <a:t>GAStech</a:t>
+            </a:r>
+            <a:r>
+              <a:rPr lang="en-US" b="0" dirty="0">
+                <a:solidFill>
+                  <a:srgbClr val="000000"/>
+                </a:solidFill>
+                <a:effectLst/>
+                <a:latin typeface="+mj-lt"/>
+              </a:rPr>
+              <a:t> organization, in PDF format.</a:t>
+            </a:r>
+          </a:p>
+          <a:p>
+            <a:r>
+              <a:rPr lang="en-US" b="0" dirty="0">
+                <a:solidFill>
+                  <a:srgbClr val="000000"/>
+                </a:solidFill>
+                <a:effectLst/>
+                <a:latin typeface="+mj-lt"/>
+              </a:rPr>
+              <a:t>A spreadsheet of </a:t>
+            </a:r>
+            <a:r>
+              <a:rPr lang="en-US" b="0" dirty="0" err="1">
+                <a:solidFill>
+                  <a:srgbClr val="000000"/>
+                </a:solidFill>
+                <a:effectLst/>
+                <a:latin typeface="+mj-lt"/>
+              </a:rPr>
+              <a:t>GAStech</a:t>
+            </a:r>
+            <a:r>
+              <a:rPr lang="en-US" b="0" dirty="0">
+                <a:solidFill>
+                  <a:srgbClr val="000000"/>
+                </a:solidFill>
+                <a:effectLst/>
+                <a:latin typeface="+mj-lt"/>
+              </a:rPr>
+              <a:t> employee records</a:t>
+            </a:r>
+          </a:p>
+          <a:p>
+            <a:r>
+              <a:rPr lang="en-US" b="0" dirty="0">
+                <a:solidFill>
+                  <a:srgbClr val="000000"/>
+                </a:solidFill>
+                <a:effectLst/>
+                <a:latin typeface="+mj-lt"/>
+              </a:rPr>
+              <a:t>Email headers from two weeks of internal </a:t>
+            </a:r>
+            <a:r>
+              <a:rPr lang="en-US" b="0" dirty="0" err="1">
+                <a:solidFill>
+                  <a:srgbClr val="000000"/>
+                </a:solidFill>
+                <a:effectLst/>
+                <a:latin typeface="+mj-lt"/>
+              </a:rPr>
+              <a:t>GAStech</a:t>
+            </a:r>
+            <a:r>
+              <a:rPr lang="en-US" b="0" dirty="0">
+                <a:solidFill>
+                  <a:srgbClr val="000000"/>
+                </a:solidFill>
+                <a:effectLst/>
+                <a:latin typeface="+mj-lt"/>
+              </a:rPr>
+              <a:t> company email</a:t>
+            </a:r>
+          </a:p>
+          <a:p>
+            <a:r>
+              <a:rPr lang="en-US" b="0" dirty="0">
+                <a:solidFill>
+                  <a:srgbClr val="000000"/>
+                </a:solidFill>
+                <a:effectLst/>
+                <a:latin typeface="+mj-lt"/>
+              </a:rPr>
+              <a:t>Resumes and short biographies of many, but not all, of the </a:t>
+            </a:r>
+            <a:r>
+              <a:rPr lang="en-US" b="0" dirty="0" err="1">
+                <a:solidFill>
+                  <a:srgbClr val="000000"/>
+                </a:solidFill>
+                <a:effectLst/>
+                <a:latin typeface="+mj-lt"/>
+              </a:rPr>
+              <a:t>GAStech</a:t>
+            </a:r>
+            <a:r>
+              <a:rPr lang="en-US" b="0" dirty="0">
+                <a:solidFill>
+                  <a:srgbClr val="000000"/>
+                </a:solidFill>
+                <a:effectLst/>
+                <a:latin typeface="+mj-lt"/>
+              </a:rPr>
+              <a:t> employees, in Microsoft Word format</a:t>
+            </a:r>
+          </a:p>
+          <a:p>
+            <a:r>
+              <a:rPr lang="en-US" b="0" dirty="0">
+                <a:solidFill>
+                  <a:srgbClr val="000000"/>
+                </a:solidFill>
+                <a:effectLst/>
+                <a:latin typeface="+mj-lt"/>
+              </a:rPr>
+              <a:t>Historical reports and descriptions of the countries involved, in Microsoft Word format</a:t>
+            </a:r>
+          </a:p>
+          <a:p>
+            <a:r>
+              <a:rPr lang="en-US" b="0" dirty="0">
+                <a:solidFill>
+                  <a:srgbClr val="000000"/>
+                </a:solidFill>
+                <a:effectLst/>
+                <a:latin typeface="+mj-lt"/>
+              </a:rPr>
+              <a:t>Relevant current and historical news reports from multiple domestic and translated foreign sources, in text file format.</a:t>
+            </a:r>
           </a:p>
         </p:txBody>
       </p:sp>
@@ -8721,7 +9693,7 @@
           <p:cNvPr id="2" name="Title 1">
             <a:extLst>
               <a:ext uri="{FF2B5EF4-FFF2-40B4-BE49-F238E27FC236}">
-                <a16:creationId xmlns:a16="http://schemas.microsoft.com/office/drawing/2014/main" id="{A30D7210-F469-734F-93FB-24E14DA88CD3}"/>
+                <a16:creationId xmlns:a16="http://schemas.microsoft.com/office/drawing/2014/main" id="{BCFBCC4B-1D22-0141-B9B9-D29673A3133C}"/>
               </a:ext>
             </a:extLst>
           </p:cNvPr>
@@ -8732,69 +9704,60 @@
             <p:ph type="title"/>
           </p:nvPr>
         </p:nvSpPr>
-        <p:spPr/>
+        <p:spPr>
+          <a:xfrm>
+            <a:off x="3687082" y="0"/>
+            <a:ext cx="6411511" cy="950898"/>
+          </a:xfrm>
+        </p:spPr>
         <p:txBody>
-          <a:bodyPr/>
+          <a:bodyPr>
+            <a:normAutofit fontScale="90000"/>
+          </a:bodyPr>
           <a:lstStyle/>
           <a:p>
-            <a:endParaRPr lang="en-US"/>
+            <a:r>
+              <a:rPr lang="en-US" dirty="0">
+                <a:latin typeface="+mj-lt"/>
+              </a:rPr>
+              <a:t>Historical Background of POK</a:t>
+            </a:r>
           </a:p>
         </p:txBody>
       </p:sp>
-      <p:sp>
-        <p:nvSpPr>
-          <p:cNvPr id="3" name="Text Placeholder 2">
-            <a:extLst>
-              <a:ext uri="{FF2B5EF4-FFF2-40B4-BE49-F238E27FC236}">
-                <a16:creationId xmlns:a16="http://schemas.microsoft.com/office/drawing/2014/main" id="{5A28A840-6E00-CB42-929F-47504AC07C21}"/>
-              </a:ext>
-            </a:extLst>
-          </p:cNvPr>
-          <p:cNvSpPr>
-            <a:spLocks noGrp="1"/>
-          </p:cNvSpPr>
-          <p:nvPr>
-            <p:ph type="body" idx="1"/>
-          </p:nvPr>
-        </p:nvSpPr>
-        <p:spPr/>
-        <p:txBody>
-          <a:bodyPr/>
-          <a:lstStyle/>
-          <a:p>
-            <a:endParaRPr lang="en-US"/>
-          </a:p>
-        </p:txBody>
-      </p:sp>
-      <p:sp>
-        <p:nvSpPr>
-          <p:cNvPr id="4" name="Text Placeholder 3">
-            <a:extLst>
-              <a:ext uri="{FF2B5EF4-FFF2-40B4-BE49-F238E27FC236}">
-                <a16:creationId xmlns:a16="http://schemas.microsoft.com/office/drawing/2014/main" id="{763D938D-8B54-3746-A0C6-B79655894B19}"/>
-              </a:ext>
-            </a:extLst>
-          </p:cNvPr>
-          <p:cNvSpPr>
-            <a:spLocks noGrp="1"/>
-          </p:cNvSpPr>
-          <p:nvPr>
-            <p:ph type="body" idx="11"/>
-          </p:nvPr>
-        </p:nvSpPr>
-        <p:spPr/>
-        <p:txBody>
-          <a:bodyPr/>
-          <a:lstStyle/>
-          <a:p>
-            <a:endParaRPr lang="en-US"/>
-          </a:p>
-        </p:txBody>
-      </p:sp>
+      <p:pic>
+        <p:nvPicPr>
+          <p:cNvPr id="13" name="Content Placeholder 12" descr="A picture containing text, screenshot, font, circle&#10;&#10;Description automatically generated">
+            <a:extLst>
+              <a:ext uri="{FF2B5EF4-FFF2-40B4-BE49-F238E27FC236}">
+                <a16:creationId xmlns:a16="http://schemas.microsoft.com/office/drawing/2014/main" id="{4ADF1341-4D60-4D85-C05C-82679260A3F4}"/>
+              </a:ext>
+            </a:extLst>
+          </p:cNvPr>
+          <p:cNvPicPr>
+            <a:picLocks noGrp="1" noChangeAspect="1"/>
+          </p:cNvPicPr>
+          <p:nvPr>
+            <p:ph idx="1"/>
+          </p:nvPr>
+        </p:nvPicPr>
+        <p:blipFill>
+          <a:blip r:embed="rId3"/>
+          <a:stretch>
+            <a:fillRect/>
+          </a:stretch>
+        </p:blipFill>
+        <p:spPr>
+          <a:xfrm>
+            <a:off x="321548" y="691613"/>
+            <a:ext cx="8787002" cy="5992128"/>
+          </a:xfrm>
+        </p:spPr>
+      </p:pic>
     </p:spTree>
     <p:extLst>
       <p:ext uri="{BB962C8B-B14F-4D97-AF65-F5344CB8AC3E}">
-        <p14:creationId xmlns:p14="http://schemas.microsoft.com/office/powerpoint/2010/main" val="106627059"/>
+        <p14:creationId xmlns:p14="http://schemas.microsoft.com/office/powerpoint/2010/main" val="248586208"/>
       </p:ext>
     </p:extLst>
   </p:cSld>
@@ -8823,10 +9786,10 @@
       </p:grpSpPr>
       <p:sp>
         <p:nvSpPr>
-          <p:cNvPr id="2" name="Text Placeholder 1">
-            <a:extLst>
-              <a:ext uri="{FF2B5EF4-FFF2-40B4-BE49-F238E27FC236}">
-                <a16:creationId xmlns:a16="http://schemas.microsoft.com/office/drawing/2014/main" id="{39CFA61C-A3A5-6C49-8B97-554C0781BA39}"/>
+          <p:cNvPr id="2" name="Title 1">
+            <a:extLst>
+              <a:ext uri="{FF2B5EF4-FFF2-40B4-BE49-F238E27FC236}">
+                <a16:creationId xmlns:a16="http://schemas.microsoft.com/office/drawing/2014/main" id="{A30D7210-F469-734F-93FB-24E14DA88CD3}"/>
               </a:ext>
             </a:extLst>
           </p:cNvPr>
@@ -8834,97 +9797,57 @@
             <a:spLocks noGrp="1"/>
           </p:cNvSpPr>
           <p:nvPr>
-            <p:ph type="body" idx="1"/>
+            <p:ph type="title"/>
           </p:nvPr>
         </p:nvSpPr>
         <p:spPr/>
         <p:txBody>
-          <a:bodyPr/>
+          <a:bodyPr>
+            <a:normAutofit fontScale="90000"/>
+          </a:bodyPr>
           <a:lstStyle/>
           <a:p>
-            <a:endParaRPr lang="en-US"/>
+            <a:r>
+              <a:rPr lang="en-US" dirty="0"/>
+              <a:t>Founding Structure of POK Network</a:t>
+            </a:r>
           </a:p>
         </p:txBody>
       </p:sp>
-      <p:sp>
-        <p:nvSpPr>
-          <p:cNvPr id="3" name="Text Placeholder 2">
-            <a:extLst>
-              <a:ext uri="{FF2B5EF4-FFF2-40B4-BE49-F238E27FC236}">
-                <a16:creationId xmlns:a16="http://schemas.microsoft.com/office/drawing/2014/main" id="{7D175072-5513-8F40-964F-46180A852269}"/>
-              </a:ext>
-            </a:extLst>
-          </p:cNvPr>
-          <p:cNvSpPr>
-            <a:spLocks noGrp="1"/>
-          </p:cNvSpPr>
-          <p:nvPr>
-            <p:ph type="body" idx="10"/>
-          </p:nvPr>
-        </p:nvSpPr>
-        <p:spPr/>
-        <p:txBody>
-          <a:bodyPr/>
-          <a:lstStyle/>
-          <a:p>
-            <a:endParaRPr lang="en-US"/>
-          </a:p>
-        </p:txBody>
-      </p:sp>
-      <p:sp>
-        <p:nvSpPr>
-          <p:cNvPr id="4" name="Title 3">
-            <a:extLst>
-              <a:ext uri="{FF2B5EF4-FFF2-40B4-BE49-F238E27FC236}">
-                <a16:creationId xmlns:a16="http://schemas.microsoft.com/office/drawing/2014/main" id="{D5C31181-9F71-124A-A616-B52278965590}"/>
-              </a:ext>
-            </a:extLst>
-          </p:cNvPr>
-          <p:cNvSpPr>
-            <a:spLocks noGrp="1"/>
-          </p:cNvSpPr>
-          <p:nvPr>
-            <p:ph type="title"/>
-          </p:nvPr>
-        </p:nvSpPr>
-        <p:spPr/>
-        <p:txBody>
-          <a:bodyPr/>
-          <a:lstStyle/>
-          <a:p>
-            <a:endParaRPr lang="en-US"/>
-          </a:p>
-        </p:txBody>
-      </p:sp>
-      <p:sp>
-        <p:nvSpPr>
-          <p:cNvPr id="5" name="Text Placeholder 4">
-            <a:extLst>
-              <a:ext uri="{FF2B5EF4-FFF2-40B4-BE49-F238E27FC236}">
-                <a16:creationId xmlns:a16="http://schemas.microsoft.com/office/drawing/2014/main" id="{71F61833-26BF-DD42-B0D6-1248ED05A257}"/>
-              </a:ext>
-            </a:extLst>
-          </p:cNvPr>
-          <p:cNvSpPr>
-            <a:spLocks noGrp="1"/>
-          </p:cNvSpPr>
-          <p:nvPr>
-            <p:ph type="body" idx="11"/>
-          </p:nvPr>
-        </p:nvSpPr>
-        <p:spPr/>
-        <p:txBody>
-          <a:bodyPr/>
-          <a:lstStyle/>
-          <a:p>
-            <a:endParaRPr lang="en-US"/>
-          </a:p>
-        </p:txBody>
-      </p:sp>
+      <p:pic>
+        <p:nvPicPr>
+          <p:cNvPr id="8" name="Picture 7" descr="A screenshot of a computer screen&#10;&#10;Description automatically generated with low confidence">
+            <a:extLst>
+              <a:ext uri="{FF2B5EF4-FFF2-40B4-BE49-F238E27FC236}">
+                <a16:creationId xmlns:a16="http://schemas.microsoft.com/office/drawing/2014/main" id="{138070CC-9F48-43B7-AFC0-D070596B686C}"/>
+              </a:ext>
+            </a:extLst>
+          </p:cNvPr>
+          <p:cNvPicPr>
+            <a:picLocks noChangeAspect="1"/>
+          </p:cNvPicPr>
+          <p:nvPr/>
+        </p:nvPicPr>
+        <p:blipFill>
+          <a:blip r:embed="rId3"/>
+          <a:stretch>
+            <a:fillRect/>
+          </a:stretch>
+        </p:blipFill>
+        <p:spPr>
+          <a:xfrm>
+            <a:off x="412955" y="1296238"/>
+            <a:ext cx="8814236" cy="5341961"/>
+          </a:xfrm>
+          <a:prstGeom prst="rect">
+            <a:avLst/>
+          </a:prstGeom>
+        </p:spPr>
+      </p:pic>
     </p:spTree>
     <p:extLst>
       <p:ext uri="{BB962C8B-B14F-4D97-AF65-F5344CB8AC3E}">
-        <p14:creationId xmlns:p14="http://schemas.microsoft.com/office/powerpoint/2010/main" val="1542365132"/>
+        <p14:creationId xmlns:p14="http://schemas.microsoft.com/office/powerpoint/2010/main" val="106627059"/>
       </p:ext>
     </p:extLst>
   </p:cSld>
@@ -8953,10 +9876,10 @@
       </p:grpSpPr>
       <p:sp>
         <p:nvSpPr>
-          <p:cNvPr id="2" name="Text Placeholder 1">
-            <a:extLst>
-              <a:ext uri="{FF2B5EF4-FFF2-40B4-BE49-F238E27FC236}">
-                <a16:creationId xmlns:a16="http://schemas.microsoft.com/office/drawing/2014/main" id="{E462C08C-C650-D141-8F4D-5C9B8A4C6CF0}"/>
+          <p:cNvPr id="4" name="Title 3">
+            <a:extLst>
+              <a:ext uri="{FF2B5EF4-FFF2-40B4-BE49-F238E27FC236}">
+                <a16:creationId xmlns:a16="http://schemas.microsoft.com/office/drawing/2014/main" id="{D5C31181-9F71-124A-A616-B52278965590}"/>
               </a:ext>
             </a:extLst>
           </p:cNvPr>
@@ -8964,97 +9887,57 @@
             <a:spLocks noGrp="1"/>
           </p:cNvSpPr>
           <p:nvPr>
-            <p:ph type="body" idx="1"/>
+            <p:ph type="title"/>
           </p:nvPr>
         </p:nvSpPr>
         <p:spPr/>
         <p:txBody>
-          <a:bodyPr/>
+          <a:bodyPr>
+            <a:normAutofit fontScale="90000"/>
+          </a:bodyPr>
           <a:lstStyle/>
           <a:p>
-            <a:endParaRPr lang="en-US"/>
+            <a:r>
+              <a:rPr lang="en-US" dirty="0"/>
+              <a:t>Recent Structure of POK Network</a:t>
+            </a:r>
           </a:p>
         </p:txBody>
       </p:sp>
-      <p:sp>
-        <p:nvSpPr>
-          <p:cNvPr id="3" name="Text Placeholder 2">
-            <a:extLst>
-              <a:ext uri="{FF2B5EF4-FFF2-40B4-BE49-F238E27FC236}">
-                <a16:creationId xmlns:a16="http://schemas.microsoft.com/office/drawing/2014/main" id="{A28A8389-6204-3047-A5FD-FED5150648E6}"/>
-              </a:ext>
-            </a:extLst>
-          </p:cNvPr>
-          <p:cNvSpPr>
-            <a:spLocks noGrp="1"/>
-          </p:cNvSpPr>
-          <p:nvPr>
-            <p:ph type="body" idx="10"/>
-          </p:nvPr>
-        </p:nvSpPr>
-        <p:spPr/>
-        <p:txBody>
-          <a:bodyPr/>
-          <a:lstStyle/>
-          <a:p>
-            <a:endParaRPr lang="en-US"/>
-          </a:p>
-        </p:txBody>
-      </p:sp>
-      <p:sp>
-        <p:nvSpPr>
-          <p:cNvPr id="4" name="Title 3">
-            <a:extLst>
-              <a:ext uri="{FF2B5EF4-FFF2-40B4-BE49-F238E27FC236}">
-                <a16:creationId xmlns:a16="http://schemas.microsoft.com/office/drawing/2014/main" id="{98885857-55A3-B84A-9645-0D6CA4FAC082}"/>
-              </a:ext>
-            </a:extLst>
-          </p:cNvPr>
-          <p:cNvSpPr>
-            <a:spLocks noGrp="1"/>
-          </p:cNvSpPr>
-          <p:nvPr>
-            <p:ph type="title"/>
-          </p:nvPr>
-        </p:nvSpPr>
-        <p:spPr/>
-        <p:txBody>
-          <a:bodyPr/>
-          <a:lstStyle/>
-          <a:p>
-            <a:endParaRPr lang="en-US"/>
-          </a:p>
-        </p:txBody>
-      </p:sp>
-      <p:sp>
-        <p:nvSpPr>
-          <p:cNvPr id="5" name="Text Placeholder 4">
-            <a:extLst>
-              <a:ext uri="{FF2B5EF4-FFF2-40B4-BE49-F238E27FC236}">
-                <a16:creationId xmlns:a16="http://schemas.microsoft.com/office/drawing/2014/main" id="{AFAE9434-BDE7-5744-9B9E-91861EB439A9}"/>
-              </a:ext>
-            </a:extLst>
-          </p:cNvPr>
-          <p:cNvSpPr>
-            <a:spLocks noGrp="1"/>
-          </p:cNvSpPr>
-          <p:nvPr>
-            <p:ph type="body" idx="11"/>
-          </p:nvPr>
-        </p:nvSpPr>
-        <p:spPr/>
-        <p:txBody>
-          <a:bodyPr/>
-          <a:lstStyle/>
-          <a:p>
-            <a:endParaRPr lang="en-US"/>
-          </a:p>
-        </p:txBody>
-      </p:sp>
+      <p:pic>
+        <p:nvPicPr>
+          <p:cNvPr id="3" name="Picture 2" descr="A picture containing text, screenshot, font, line&#10;&#10;Description automatically generated">
+            <a:extLst>
+              <a:ext uri="{FF2B5EF4-FFF2-40B4-BE49-F238E27FC236}">
+                <a16:creationId xmlns:a16="http://schemas.microsoft.com/office/drawing/2014/main" id="{E51784BC-A2AF-53E1-1B52-46F5071C7838}"/>
+              </a:ext>
+            </a:extLst>
+          </p:cNvPr>
+          <p:cNvPicPr>
+            <a:picLocks noChangeAspect="1"/>
+          </p:cNvPicPr>
+          <p:nvPr/>
+        </p:nvPicPr>
+        <p:blipFill>
+          <a:blip r:embed="rId3"/>
+          <a:stretch>
+            <a:fillRect/>
+          </a:stretch>
+        </p:blipFill>
+        <p:spPr>
+          <a:xfrm>
+            <a:off x="1343077" y="2352068"/>
+            <a:ext cx="8983329" cy="1952898"/>
+          </a:xfrm>
+          <a:prstGeom prst="rect">
+            <a:avLst/>
+          </a:prstGeom>
+        </p:spPr>
+      </p:pic>
     </p:spTree>
     <p:extLst>
       <p:ext uri="{BB962C8B-B14F-4D97-AF65-F5344CB8AC3E}">
-        <p14:creationId xmlns:p14="http://schemas.microsoft.com/office/powerpoint/2010/main" val="3065850940"/>
+        <p14:creationId xmlns:p14="http://schemas.microsoft.com/office/powerpoint/2010/main" val="1542365132"/>
       </p:ext>
     </p:extLst>
   </p:cSld>
@@ -9083,10 +9966,10 @@
       </p:grpSpPr>
       <p:sp>
         <p:nvSpPr>
-          <p:cNvPr id="2" name="Text Placeholder 1">
-            <a:extLst>
-              <a:ext uri="{FF2B5EF4-FFF2-40B4-BE49-F238E27FC236}">
-                <a16:creationId xmlns:a16="http://schemas.microsoft.com/office/drawing/2014/main" id="{67043EEA-6C9E-D640-AC6F-0839D574211C}"/>
+          <p:cNvPr id="4" name="Title 3">
+            <a:extLst>
+              <a:ext uri="{FF2B5EF4-FFF2-40B4-BE49-F238E27FC236}">
+                <a16:creationId xmlns:a16="http://schemas.microsoft.com/office/drawing/2014/main" id="{98885857-55A3-B84A-9645-0D6CA4FAC082}"/>
               </a:ext>
             </a:extLst>
           </p:cNvPr>
@@ -9094,97 +9977,57 @@
             <a:spLocks noGrp="1"/>
           </p:cNvSpPr>
           <p:nvPr>
-            <p:ph type="body" idx="1"/>
+            <p:ph type="title"/>
           </p:nvPr>
         </p:nvSpPr>
         <p:spPr/>
         <p:txBody>
-          <a:bodyPr/>
+          <a:bodyPr>
+            <a:normAutofit fontScale="90000"/>
+          </a:bodyPr>
           <a:lstStyle/>
           <a:p>
-            <a:endParaRPr lang="en-US"/>
+            <a:r>
+              <a:rPr lang="en-US" dirty="0"/>
+              <a:t>GASTech Notable Employees</a:t>
+            </a:r>
           </a:p>
         </p:txBody>
       </p:sp>
-      <p:sp>
-        <p:nvSpPr>
-          <p:cNvPr id="3" name="Text Placeholder 2">
-            <a:extLst>
-              <a:ext uri="{FF2B5EF4-FFF2-40B4-BE49-F238E27FC236}">
-                <a16:creationId xmlns:a16="http://schemas.microsoft.com/office/drawing/2014/main" id="{6605EA6C-7F0D-844B-A2FB-53C8999EA361}"/>
-              </a:ext>
-            </a:extLst>
-          </p:cNvPr>
-          <p:cNvSpPr>
-            <a:spLocks noGrp="1"/>
-          </p:cNvSpPr>
-          <p:nvPr>
-            <p:ph type="body" idx="10"/>
-          </p:nvPr>
-        </p:nvSpPr>
-        <p:spPr/>
-        <p:txBody>
-          <a:bodyPr/>
-          <a:lstStyle/>
-          <a:p>
-            <a:endParaRPr lang="en-US"/>
-          </a:p>
-        </p:txBody>
-      </p:sp>
-      <p:sp>
-        <p:nvSpPr>
-          <p:cNvPr id="4" name="Title 3">
-            <a:extLst>
-              <a:ext uri="{FF2B5EF4-FFF2-40B4-BE49-F238E27FC236}">
-                <a16:creationId xmlns:a16="http://schemas.microsoft.com/office/drawing/2014/main" id="{9AD34FDC-870F-1F44-9337-AB3170DCD07C}"/>
-              </a:ext>
-            </a:extLst>
-          </p:cNvPr>
-          <p:cNvSpPr>
-            <a:spLocks noGrp="1"/>
-          </p:cNvSpPr>
-          <p:nvPr>
-            <p:ph type="title"/>
-          </p:nvPr>
-        </p:nvSpPr>
-        <p:spPr/>
-        <p:txBody>
-          <a:bodyPr/>
-          <a:lstStyle/>
-          <a:p>
-            <a:endParaRPr lang="en-US"/>
-          </a:p>
-        </p:txBody>
-      </p:sp>
-      <p:sp>
-        <p:nvSpPr>
-          <p:cNvPr id="5" name="Text Placeholder 4">
-            <a:extLst>
-              <a:ext uri="{FF2B5EF4-FFF2-40B4-BE49-F238E27FC236}">
-                <a16:creationId xmlns:a16="http://schemas.microsoft.com/office/drawing/2014/main" id="{DF6165E9-BB8A-7543-BED8-E080F7DA71DA}"/>
-              </a:ext>
-            </a:extLst>
-          </p:cNvPr>
-          <p:cNvSpPr>
-            <a:spLocks noGrp="1"/>
-          </p:cNvSpPr>
-          <p:nvPr>
-            <p:ph type="body" idx="11"/>
-          </p:nvPr>
-        </p:nvSpPr>
-        <p:spPr/>
-        <p:txBody>
-          <a:bodyPr/>
-          <a:lstStyle/>
-          <a:p>
-            <a:endParaRPr lang="en-US"/>
-          </a:p>
-        </p:txBody>
-      </p:sp>
+      <p:pic>
+        <p:nvPicPr>
+          <p:cNvPr id="7" name="Picture 6" descr="A screenshot of a computer&#10;&#10;Description automatically generated with medium confidence">
+            <a:extLst>
+              <a:ext uri="{FF2B5EF4-FFF2-40B4-BE49-F238E27FC236}">
+                <a16:creationId xmlns:a16="http://schemas.microsoft.com/office/drawing/2014/main" id="{97E5F66A-9F40-84E2-4667-4A87581E4152}"/>
+              </a:ext>
+            </a:extLst>
+          </p:cNvPr>
+          <p:cNvPicPr>
+            <a:picLocks noChangeAspect="1"/>
+          </p:cNvPicPr>
+          <p:nvPr/>
+        </p:nvPicPr>
+        <p:blipFill>
+          <a:blip r:embed="rId2"/>
+          <a:stretch>
+            <a:fillRect/>
+          </a:stretch>
+        </p:blipFill>
+        <p:spPr>
+          <a:xfrm>
+            <a:off x="199790" y="1398782"/>
+            <a:ext cx="11631648" cy="4479504"/>
+          </a:xfrm>
+          <a:prstGeom prst="rect">
+            <a:avLst/>
+          </a:prstGeom>
+        </p:spPr>
+      </p:pic>
     </p:spTree>
     <p:extLst>
       <p:ext uri="{BB962C8B-B14F-4D97-AF65-F5344CB8AC3E}">
-        <p14:creationId xmlns:p14="http://schemas.microsoft.com/office/powerpoint/2010/main" val="2540176846"/>
+        <p14:creationId xmlns:p14="http://schemas.microsoft.com/office/powerpoint/2010/main" val="3065850940"/>
       </p:ext>
     </p:extLst>
   </p:cSld>
@@ -9235,110 +10078,16 @@
         <a:srgbClr val="B5A574"/>
       </a:folHlink>
     </a:clrScheme>
-    <a:fontScheme name="Office">
+    <a:fontScheme name="Custom 1">
       <a:majorFont>
-        <a:latin typeface="Calibri Light" panose="020F0302020204030204"/>
+        <a:latin typeface="Verdana"/>
         <a:ea typeface=""/>
         <a:cs typeface=""/>
-        <a:font script="Jpan" typeface="游ゴシック Light"/>
-        <a:font script="Hang" typeface="맑은 고딕"/>
-        <a:font script="Hans" typeface="等线 Light"/>
-        <a:font script="Hant" typeface="新細明體"/>
-        <a:font script="Arab" typeface="Times New Roman"/>
-        <a:font script="Hebr" typeface="Times New Roman"/>
-        <a:font script="Thai" typeface="Angsana New"/>
-        <a:font script="Ethi" typeface="Nyala"/>
-        <a:font script="Beng" typeface="Vrinda"/>
-        <a:font script="Gujr" typeface="Shruti"/>
-        <a:font script="Khmr" typeface="MoolBoran"/>
-        <a:font script="Knda" typeface="Tunga"/>
-        <a:font script="Guru" typeface="Raavi"/>
-        <a:font script="Cans" typeface="Euphemia"/>
-        <a:font script="Cher" typeface="Plantagenet Cherokee"/>
-        <a:font script="Yiii" typeface="Microsoft Yi Baiti"/>
-        <a:font script="Tibt" typeface="Microsoft Himalaya"/>
-        <a:font script="Thaa" typeface="MV Boli"/>
-        <a:font script="Deva" typeface="Mangal"/>
-        <a:font script="Telu" typeface="Gautami"/>
-        <a:font script="Taml" typeface="Latha"/>
-        <a:font script="Syrc" typeface="Estrangelo Edessa"/>
-        <a:font script="Orya" typeface="Kalinga"/>
-        <a:font script="Mlym" typeface="Kartika"/>
-        <a:font script="Laoo" typeface="DokChampa"/>
-        <a:font script="Sinh" typeface="Iskoola Pota"/>
-        <a:font script="Mong" typeface="Mongolian Baiti"/>
-        <a:font script="Viet" typeface="Times New Roman"/>
-        <a:font script="Uigh" typeface="Microsoft Uighur"/>
-        <a:font script="Geor" typeface="Sylfaen"/>
-        <a:font script="Armn" typeface="Arial"/>
-        <a:font script="Bugi" typeface="Leelawadee UI"/>
-        <a:font script="Bopo" typeface="Microsoft JhengHei"/>
-        <a:font script="Java" typeface="Javanese Text"/>
-        <a:font script="Lisu" typeface="Segoe UI"/>
-        <a:font script="Mymr" typeface="Myanmar Text"/>
-        <a:font script="Nkoo" typeface="Ebrima"/>
-        <a:font script="Olck" typeface="Nirmala UI"/>
-        <a:font script="Osma" typeface="Ebrima"/>
-        <a:font script="Phag" typeface="Phagspa"/>
-        <a:font script="Syrn" typeface="Estrangelo Edessa"/>
-        <a:font script="Syrj" typeface="Estrangelo Edessa"/>
-        <a:font script="Syre" typeface="Estrangelo Edessa"/>
-        <a:font script="Sora" typeface="Nirmala UI"/>
-        <a:font script="Tale" typeface="Microsoft Tai Le"/>
-        <a:font script="Talu" typeface="Microsoft New Tai Lue"/>
-        <a:font script="Tfng" typeface="Ebrima"/>
       </a:majorFont>
       <a:minorFont>
-        <a:latin typeface="Calibri" panose="020F0502020204030204"/>
+        <a:latin typeface="Verdana Pro"/>
         <a:ea typeface=""/>
         <a:cs typeface=""/>
-        <a:font script="Jpan" typeface="游ゴシック"/>
-        <a:font script="Hang" typeface="맑은 고딕"/>
-        <a:font script="Hans" typeface="等线"/>
-        <a:font script="Hant" typeface="新細明體"/>
-        <a:font script="Arab" typeface="Arial"/>
-        <a:font script="Hebr" typeface="Arial"/>
-        <a:font script="Thai" typeface="Cordia New"/>
-        <a:font script="Ethi" typeface="Nyala"/>
-        <a:font script="Beng" typeface="Vrinda"/>
-        <a:font script="Gujr" typeface="Shruti"/>
-        <a:font script="Khmr" typeface="DaunPenh"/>
-        <a:font script="Knda" typeface="Tunga"/>
-        <a:font script="Guru" typeface="Raavi"/>
-        <a:font script="Cans" typeface="Euphemia"/>
-        <a:font script="Cher" typeface="Plantagenet Cherokee"/>
-        <a:font script="Yiii" typeface="Microsoft Yi Baiti"/>
-        <a:font script="Tibt" typeface="Microsoft Himalaya"/>
-        <a:font script="Thaa" typeface="MV Boli"/>
-        <a:font script="Deva" typeface="Mangal"/>
-        <a:font script="Telu" typeface="Gautami"/>
-        <a:font script="Taml" typeface="Latha"/>
-        <a:font script="Syrc" typeface="Estrangelo Edessa"/>
-        <a:font script="Orya" typeface="Kalinga"/>
-        <a:font script="Mlym" typeface="Kartika"/>
-        <a:font script="Laoo" typeface="DokChampa"/>
-        <a:font script="Sinh" typeface="Iskoola Pota"/>
-        <a:font script="Mong" typeface="Mongolian Baiti"/>
-        <a:font script="Viet" typeface="Arial"/>
-        <a:font script="Uigh" typeface="Microsoft Uighur"/>
-        <a:font script="Geor" typeface="Sylfaen"/>
-        <a:font script="Armn" typeface="Arial"/>
-        <a:font script="Bugi" typeface="Leelawadee UI"/>
-        <a:font script="Bopo" typeface="Microsoft JhengHei"/>
-        <a:font script="Java" typeface="Javanese Text"/>
-        <a:font script="Lisu" typeface="Segoe UI"/>
-        <a:font script="Mymr" typeface="Myanmar Text"/>
-        <a:font script="Nkoo" typeface="Ebrima"/>
-        <a:font script="Olck" typeface="Nirmala UI"/>
-        <a:font script="Osma" typeface="Ebrima"/>
-        <a:font script="Phag" typeface="Phagspa"/>
-        <a:font script="Syrn" typeface="Estrangelo Edessa"/>
-        <a:font script="Syrj" typeface="Estrangelo Edessa"/>
-        <a:font script="Syre" typeface="Estrangelo Edessa"/>
-        <a:font script="Sora" typeface="Nirmala UI"/>
-        <a:font script="Tale" typeface="Microsoft Tai Le"/>
-        <a:font script="Talu" typeface="Microsoft New Tai Lue"/>
-        <a:font script="Tfng" typeface="Ebrima"/>
       </a:minorFont>
     </a:fontScheme>
     <a:fmtScheme name="Office">

</xml_diff>